<commit_message>
added one bullet point
</commit_message>
<xml_diff>
--- a/slides/intro-StefanMehner.pptx
+++ b/slides/intro-StefanMehner.pptx
@@ -34,7 +34,7 @@
       </p:grpSpPr>
       <p:sp>
         <p:nvSpPr>
-          <p:cNvPr id="41" name="PlaceHolder 1"/>
+          <p:cNvPr id="36" name="PlaceHolder 1"/>
           <p:cNvSpPr>
             <a:spLocks noGrp="1"/>
           </p:cNvSpPr>
@@ -84,7 +84,7 @@
       </p:sp>
       <p:sp>
         <p:nvSpPr>
-          <p:cNvPr id="42" name="PlaceHolder 2"/>
+          <p:cNvPr id="37" name="PlaceHolder 2"/>
           <p:cNvSpPr>
             <a:spLocks noGrp="1"/>
           </p:cNvSpPr>
@@ -134,7 +134,7 @@
       </p:sp>
       <p:sp>
         <p:nvSpPr>
-          <p:cNvPr id="43" name="PlaceHolder 3"/>
+          <p:cNvPr id="38" name="PlaceHolder 3"/>
           <p:cNvSpPr>
             <a:spLocks noGrp="1"/>
           </p:cNvSpPr>
@@ -185,7 +185,7 @@
       </p:sp>
       <p:sp>
         <p:nvSpPr>
-          <p:cNvPr id="44" name="PlaceHolder 4"/>
+          <p:cNvPr id="39" name="PlaceHolder 4"/>
           <p:cNvSpPr>
             <a:spLocks noGrp="1"/>
           </p:cNvSpPr>
@@ -235,7 +235,7 @@
       </p:sp>
       <p:sp>
         <p:nvSpPr>
-          <p:cNvPr id="45" name="PlaceHolder 5"/>
+          <p:cNvPr id="40" name="PlaceHolder 5"/>
           <p:cNvSpPr>
             <a:spLocks noGrp="1"/>
           </p:cNvSpPr>
@@ -256,7 +256,7 @@
           <a:bodyPr lIns="0" rIns="0" tIns="0" bIns="0" anchor="b"/>
           <a:p>
             <a:pPr algn="r"/>
-            <a:fld id="{C28D1220-B7A8-4875-8CF1-C3EEFFB11B42}" type="slidenum">
+            <a:fld id="{52A740BF-1733-4178-8A83-F612C85C403B}" type="slidenum">
               <a:rPr b="0" lang="de-DE" sz="1400" spc="-1" strike="noStrike">
                 <a:solidFill>
                   <a:srgbClr val="000000"/>
@@ -309,7 +309,7 @@
       </p:grpSpPr>
       <p:sp>
         <p:nvSpPr>
-          <p:cNvPr id="54" name="PlaceHolder 1"/>
+          <p:cNvPr id="49" name="PlaceHolder 1"/>
           <p:cNvSpPr>
             <a:spLocks noGrp="1"/>
           </p:cNvSpPr>
@@ -320,14 +320,14 @@
         <p:spPr>
           <a:xfrm>
             <a:off x="685800" y="4343400"/>
-            <a:ext cx="5486040" cy="4114440"/>
-          </a:xfrm>
-          <a:prstGeom prst="rect">
-            <a:avLst/>
-          </a:prstGeom>
-        </p:spPr>
-        <p:txBody>
-          <a:bodyPr/>
+            <a:ext cx="5485680" cy="4114080"/>
+          </a:xfrm>
+          <a:prstGeom prst="rect">
+            <a:avLst/>
+          </a:prstGeom>
+        </p:spPr>
+        <p:txBody>
+          <a:bodyPr lIns="0" rIns="0" tIns="0" bIns="0"/>
           <a:p>
             <a:endParaRPr b="0" lang="de-DE" sz="2000" spc="-1" strike="noStrike">
               <a:solidFill>
@@ -345,14 +345,14 @@
       </p:sp>
       <p:sp>
         <p:nvSpPr>
-          <p:cNvPr id="55" name="TextShape 2"/>
-          <p:cNvSpPr txBox="1"/>
+          <p:cNvPr id="50" name="CustomShape 2"/>
+          <p:cNvSpPr/>
           <p:nvPr/>
         </p:nvSpPr>
         <p:spPr>
           <a:xfrm>
             <a:off x="3884760" y="8685360"/>
-            <a:ext cx="2971440" cy="456840"/>
+            <a:ext cx="2971080" cy="456480"/>
           </a:xfrm>
           <a:prstGeom prst="rect">
             <a:avLst/>
@@ -362,42 +362,12 @@
             <a:noFill/>
           </a:ln>
         </p:spPr>
-        <p:txBody>
-          <a:bodyPr anchor="b"/>
-          <a:p>
-            <a:pPr algn="r">
-              <a:lnSpc>
-                <a:spcPct val="100000"/>
-              </a:lnSpc>
-            </a:pPr>
-            <a:fld id="{6D6EE68A-3978-42E5-9511-A0E5BD6D51D5}" type="slidenum">
-              <a:rPr b="0" lang="de-DE" sz="1200" spc="-1" strike="noStrike">
-                <a:solidFill>
-                  <a:srgbClr val="000000"/>
-                </a:solidFill>
-                <a:uFill>
-                  <a:solidFill>
-                    <a:srgbClr val="ffffff"/>
-                  </a:solidFill>
-                </a:uFill>
-                <a:latin typeface="+mn-lt"/>
-                <a:ea typeface="+mn-ea"/>
-              </a:rPr>
-              <a:t>&lt;Foliennummer&gt;</a:t>
-            </a:fld>
-            <a:endParaRPr b="0" lang="de-DE" sz="1400" spc="-1" strike="noStrike">
-              <a:solidFill>
-                <a:srgbClr val="000000"/>
-              </a:solidFill>
-              <a:uFill>
-                <a:solidFill>
-                  <a:srgbClr val="ffffff"/>
-                </a:solidFill>
-              </a:uFill>
-              <a:latin typeface="Times New Roman"/>
-            </a:endParaRPr>
-          </a:p>
-        </p:txBody>
+        <p:style>
+          <a:lnRef idx="0"/>
+          <a:fillRef idx="0"/>
+          <a:effectRef idx="0"/>
+          <a:fontRef idx="minor"/>
+        </p:style>
       </p:sp>
     </p:spTree>
   </p:cSld>
@@ -445,7 +415,7 @@
       </p:grpSpPr>
       <p:sp>
         <p:nvSpPr>
-          <p:cNvPr id="26" name="PlaceHolder 1"/>
+          <p:cNvPr id="21" name="PlaceHolder 1"/>
           <p:cNvSpPr>
             <a:spLocks noGrp="1"/>
           </p:cNvSpPr>
@@ -455,8 +425,8 @@
         </p:nvSpPr>
         <p:spPr>
           <a:xfrm>
-            <a:off x="457200" y="274680"/>
-            <a:ext cx="8229240" cy="1142640"/>
+            <a:off x="457200" y="273600"/>
+            <a:ext cx="8229240" cy="1144800"/>
           </a:xfrm>
           <a:prstGeom prst="rect">
             <a:avLst/>
@@ -465,23 +435,24 @@
         <p:txBody>
           <a:bodyPr lIns="0" rIns="0" tIns="0" bIns="0" anchor="ctr"/>
           <a:p>
-            <a:endParaRPr b="0" lang="en-US" sz="1800" spc="-1" strike="noStrike">
-              <a:solidFill>
-                <a:srgbClr val="000000"/>
-              </a:solidFill>
-              <a:uFill>
-                <a:solidFill>
-                  <a:srgbClr val="ffffff"/>
-                </a:solidFill>
-              </a:uFill>
-              <a:latin typeface="Calibri"/>
-            </a:endParaRPr>
-          </a:p>
-        </p:txBody>
-      </p:sp>
-      <p:sp>
-        <p:nvSpPr>
-          <p:cNvPr id="27" name="PlaceHolder 2"/>
+            <a:pPr algn="ctr"/>
+            <a:endParaRPr b="0" lang="de-DE" sz="4400" spc="-1" strike="noStrike">
+              <a:solidFill>
+                <a:srgbClr val="000000"/>
+              </a:solidFill>
+              <a:uFill>
+                <a:solidFill>
+                  <a:srgbClr val="ffffff"/>
+                </a:solidFill>
+              </a:uFill>
+              <a:latin typeface="Arial"/>
+            </a:endParaRPr>
+          </a:p>
+        </p:txBody>
+      </p:sp>
+      <p:sp>
+        <p:nvSpPr>
+          <p:cNvPr id="22" name="PlaceHolder 2"/>
           <p:cNvSpPr>
             <a:spLocks noGrp="1"/>
           </p:cNvSpPr>
@@ -491,8 +462,8 @@
         </p:nvSpPr>
         <p:spPr>
           <a:xfrm>
-            <a:off x="457200" y="1600200"/>
-            <a:ext cx="8229240" cy="2158560"/>
+            <a:off x="457200" y="1604520"/>
+            <a:ext cx="8229240" cy="1896840"/>
           </a:xfrm>
           <a:prstGeom prst="rect">
             <a:avLst/>
@@ -501,23 +472,23 @@
         <p:txBody>
           <a:bodyPr lIns="0" rIns="0" tIns="0" bIns="0"/>
           <a:p>
-            <a:endParaRPr b="0" lang="en-US" sz="3200" spc="-1" strike="noStrike">
-              <a:solidFill>
-                <a:srgbClr val="000000"/>
-              </a:solidFill>
-              <a:uFill>
-                <a:solidFill>
-                  <a:srgbClr val="ffffff"/>
-                </a:solidFill>
-              </a:uFill>
-              <a:latin typeface="Calibri"/>
-            </a:endParaRPr>
-          </a:p>
-        </p:txBody>
-      </p:sp>
-      <p:sp>
-        <p:nvSpPr>
-          <p:cNvPr id="28" name="PlaceHolder 3"/>
+            <a:endParaRPr b="0" lang="de-DE" sz="3200" spc="-1" strike="noStrike">
+              <a:solidFill>
+                <a:srgbClr val="000000"/>
+              </a:solidFill>
+              <a:uFill>
+                <a:solidFill>
+                  <a:srgbClr val="ffffff"/>
+                </a:solidFill>
+              </a:uFill>
+              <a:latin typeface="Arial"/>
+            </a:endParaRPr>
+          </a:p>
+        </p:txBody>
+      </p:sp>
+      <p:sp>
+        <p:nvSpPr>
+          <p:cNvPr id="23" name="PlaceHolder 3"/>
           <p:cNvSpPr>
             <a:spLocks noGrp="1"/>
           </p:cNvSpPr>
@@ -527,8 +498,8 @@
         </p:nvSpPr>
         <p:spPr>
           <a:xfrm>
-            <a:off x="457200" y="3964320"/>
-            <a:ext cx="8229240" cy="2158560"/>
+            <a:off x="457200" y="3682080"/>
+            <a:ext cx="8229240" cy="1896840"/>
           </a:xfrm>
           <a:prstGeom prst="rect">
             <a:avLst/>
@@ -537,16 +508,16 @@
         <p:txBody>
           <a:bodyPr lIns="0" rIns="0" tIns="0" bIns="0"/>
           <a:p>
-            <a:endParaRPr b="0" lang="en-US" sz="3200" spc="-1" strike="noStrike">
-              <a:solidFill>
-                <a:srgbClr val="000000"/>
-              </a:solidFill>
-              <a:uFill>
-                <a:solidFill>
-                  <a:srgbClr val="ffffff"/>
-                </a:solidFill>
-              </a:uFill>
-              <a:latin typeface="Calibri"/>
+            <a:endParaRPr b="0" lang="de-DE" sz="3200" spc="-1" strike="noStrike">
+              <a:solidFill>
+                <a:srgbClr val="000000"/>
+              </a:solidFill>
+              <a:uFill>
+                <a:solidFill>
+                  <a:srgbClr val="ffffff"/>
+                </a:solidFill>
+              </a:uFill>
+              <a:latin typeface="Arial"/>
             </a:endParaRPr>
           </a:p>
         </p:txBody>
@@ -575,7 +546,7 @@
       </p:grpSpPr>
       <p:sp>
         <p:nvSpPr>
-          <p:cNvPr id="29" name="PlaceHolder 1"/>
+          <p:cNvPr id="24" name="PlaceHolder 1"/>
           <p:cNvSpPr>
             <a:spLocks noGrp="1"/>
           </p:cNvSpPr>
@@ -585,8 +556,8 @@
         </p:nvSpPr>
         <p:spPr>
           <a:xfrm>
-            <a:off x="457200" y="274680"/>
-            <a:ext cx="8229240" cy="1142640"/>
+            <a:off x="457200" y="273600"/>
+            <a:ext cx="8229240" cy="1144800"/>
           </a:xfrm>
           <a:prstGeom prst="rect">
             <a:avLst/>
@@ -595,23 +566,24 @@
         <p:txBody>
           <a:bodyPr lIns="0" rIns="0" tIns="0" bIns="0" anchor="ctr"/>
           <a:p>
-            <a:endParaRPr b="0" lang="en-US" sz="1800" spc="-1" strike="noStrike">
-              <a:solidFill>
-                <a:srgbClr val="000000"/>
-              </a:solidFill>
-              <a:uFill>
-                <a:solidFill>
-                  <a:srgbClr val="ffffff"/>
-                </a:solidFill>
-              </a:uFill>
-              <a:latin typeface="Calibri"/>
-            </a:endParaRPr>
-          </a:p>
-        </p:txBody>
-      </p:sp>
-      <p:sp>
-        <p:nvSpPr>
-          <p:cNvPr id="30" name="PlaceHolder 2"/>
+            <a:pPr algn="ctr"/>
+            <a:endParaRPr b="0" lang="de-DE" sz="4400" spc="-1" strike="noStrike">
+              <a:solidFill>
+                <a:srgbClr val="000000"/>
+              </a:solidFill>
+              <a:uFill>
+                <a:solidFill>
+                  <a:srgbClr val="ffffff"/>
+                </a:solidFill>
+              </a:uFill>
+              <a:latin typeface="Arial"/>
+            </a:endParaRPr>
+          </a:p>
+        </p:txBody>
+      </p:sp>
+      <p:sp>
+        <p:nvSpPr>
+          <p:cNvPr id="25" name="PlaceHolder 2"/>
           <p:cNvSpPr>
             <a:spLocks noGrp="1"/>
           </p:cNvSpPr>
@@ -621,8 +593,8 @@
         </p:nvSpPr>
         <p:spPr>
           <a:xfrm>
-            <a:off x="457200" y="1600200"/>
-            <a:ext cx="4015800" cy="2158560"/>
+            <a:off x="457200" y="1604520"/>
+            <a:ext cx="4015800" cy="1896840"/>
           </a:xfrm>
           <a:prstGeom prst="rect">
             <a:avLst/>
@@ -631,23 +603,23 @@
         <p:txBody>
           <a:bodyPr lIns="0" rIns="0" tIns="0" bIns="0"/>
           <a:p>
-            <a:endParaRPr b="0" lang="en-US" sz="3200" spc="-1" strike="noStrike">
-              <a:solidFill>
-                <a:srgbClr val="000000"/>
-              </a:solidFill>
-              <a:uFill>
-                <a:solidFill>
-                  <a:srgbClr val="ffffff"/>
-                </a:solidFill>
-              </a:uFill>
-              <a:latin typeface="Calibri"/>
-            </a:endParaRPr>
-          </a:p>
-        </p:txBody>
-      </p:sp>
-      <p:sp>
-        <p:nvSpPr>
-          <p:cNvPr id="31" name="PlaceHolder 3"/>
+            <a:endParaRPr b="0" lang="de-DE" sz="3200" spc="-1" strike="noStrike">
+              <a:solidFill>
+                <a:srgbClr val="000000"/>
+              </a:solidFill>
+              <a:uFill>
+                <a:solidFill>
+                  <a:srgbClr val="ffffff"/>
+                </a:solidFill>
+              </a:uFill>
+              <a:latin typeface="Arial"/>
+            </a:endParaRPr>
+          </a:p>
+        </p:txBody>
+      </p:sp>
+      <p:sp>
+        <p:nvSpPr>
+          <p:cNvPr id="26" name="PlaceHolder 3"/>
           <p:cNvSpPr>
             <a:spLocks noGrp="1"/>
           </p:cNvSpPr>
@@ -657,8 +629,8 @@
         </p:nvSpPr>
         <p:spPr>
           <a:xfrm>
-            <a:off x="4674240" y="1600200"/>
-            <a:ext cx="4015800" cy="2158560"/>
+            <a:off x="4674240" y="1604520"/>
+            <a:ext cx="4015800" cy="1896840"/>
           </a:xfrm>
           <a:prstGeom prst="rect">
             <a:avLst/>
@@ -667,23 +639,23 @@
         <p:txBody>
           <a:bodyPr lIns="0" rIns="0" tIns="0" bIns="0"/>
           <a:p>
-            <a:endParaRPr b="0" lang="en-US" sz="3200" spc="-1" strike="noStrike">
-              <a:solidFill>
-                <a:srgbClr val="000000"/>
-              </a:solidFill>
-              <a:uFill>
-                <a:solidFill>
-                  <a:srgbClr val="ffffff"/>
-                </a:solidFill>
-              </a:uFill>
-              <a:latin typeface="Calibri"/>
-            </a:endParaRPr>
-          </a:p>
-        </p:txBody>
-      </p:sp>
-      <p:sp>
-        <p:nvSpPr>
-          <p:cNvPr id="32" name="PlaceHolder 4"/>
+            <a:endParaRPr b="0" lang="de-DE" sz="3200" spc="-1" strike="noStrike">
+              <a:solidFill>
+                <a:srgbClr val="000000"/>
+              </a:solidFill>
+              <a:uFill>
+                <a:solidFill>
+                  <a:srgbClr val="ffffff"/>
+                </a:solidFill>
+              </a:uFill>
+              <a:latin typeface="Arial"/>
+            </a:endParaRPr>
+          </a:p>
+        </p:txBody>
+      </p:sp>
+      <p:sp>
+        <p:nvSpPr>
+          <p:cNvPr id="27" name="PlaceHolder 4"/>
           <p:cNvSpPr>
             <a:spLocks noGrp="1"/>
           </p:cNvSpPr>
@@ -693,8 +665,8 @@
         </p:nvSpPr>
         <p:spPr>
           <a:xfrm>
-            <a:off x="4674240" y="3964320"/>
-            <a:ext cx="4015800" cy="2158560"/>
+            <a:off x="4674240" y="3682080"/>
+            <a:ext cx="4015800" cy="1896840"/>
           </a:xfrm>
           <a:prstGeom prst="rect">
             <a:avLst/>
@@ -703,23 +675,23 @@
         <p:txBody>
           <a:bodyPr lIns="0" rIns="0" tIns="0" bIns="0"/>
           <a:p>
-            <a:endParaRPr b="0" lang="en-US" sz="3200" spc="-1" strike="noStrike">
-              <a:solidFill>
-                <a:srgbClr val="000000"/>
-              </a:solidFill>
-              <a:uFill>
-                <a:solidFill>
-                  <a:srgbClr val="ffffff"/>
-                </a:solidFill>
-              </a:uFill>
-              <a:latin typeface="Calibri"/>
-            </a:endParaRPr>
-          </a:p>
-        </p:txBody>
-      </p:sp>
-      <p:sp>
-        <p:nvSpPr>
-          <p:cNvPr id="33" name="PlaceHolder 5"/>
+            <a:endParaRPr b="0" lang="de-DE" sz="3200" spc="-1" strike="noStrike">
+              <a:solidFill>
+                <a:srgbClr val="000000"/>
+              </a:solidFill>
+              <a:uFill>
+                <a:solidFill>
+                  <a:srgbClr val="ffffff"/>
+                </a:solidFill>
+              </a:uFill>
+              <a:latin typeface="Arial"/>
+            </a:endParaRPr>
+          </a:p>
+        </p:txBody>
+      </p:sp>
+      <p:sp>
+        <p:nvSpPr>
+          <p:cNvPr id="28" name="PlaceHolder 5"/>
           <p:cNvSpPr>
             <a:spLocks noGrp="1"/>
           </p:cNvSpPr>
@@ -729,8 +701,8 @@
         </p:nvSpPr>
         <p:spPr>
           <a:xfrm>
-            <a:off x="457200" y="3964320"/>
-            <a:ext cx="4015800" cy="2158560"/>
+            <a:off x="457200" y="3682080"/>
+            <a:ext cx="4015800" cy="1896840"/>
           </a:xfrm>
           <a:prstGeom prst="rect">
             <a:avLst/>
@@ -739,16 +711,16 @@
         <p:txBody>
           <a:bodyPr lIns="0" rIns="0" tIns="0" bIns="0"/>
           <a:p>
-            <a:endParaRPr b="0" lang="en-US" sz="3200" spc="-1" strike="noStrike">
-              <a:solidFill>
-                <a:srgbClr val="000000"/>
-              </a:solidFill>
-              <a:uFill>
-                <a:solidFill>
-                  <a:srgbClr val="ffffff"/>
-                </a:solidFill>
-              </a:uFill>
-              <a:latin typeface="Calibri"/>
+            <a:endParaRPr b="0" lang="de-DE" sz="3200" spc="-1" strike="noStrike">
+              <a:solidFill>
+                <a:srgbClr val="000000"/>
+              </a:solidFill>
+              <a:uFill>
+                <a:solidFill>
+                  <a:srgbClr val="ffffff"/>
+                </a:solidFill>
+              </a:uFill>
+              <a:latin typeface="Arial"/>
             </a:endParaRPr>
           </a:p>
         </p:txBody>
@@ -777,7 +749,7 @@
       </p:grpSpPr>
       <p:sp>
         <p:nvSpPr>
-          <p:cNvPr id="34" name="PlaceHolder 1"/>
+          <p:cNvPr id="29" name="PlaceHolder 1"/>
           <p:cNvSpPr>
             <a:spLocks noGrp="1"/>
           </p:cNvSpPr>
@@ -787,8 +759,8 @@
         </p:nvSpPr>
         <p:spPr>
           <a:xfrm>
-            <a:off x="457200" y="274680"/>
-            <a:ext cx="8229240" cy="1142640"/>
+            <a:off x="457200" y="273600"/>
+            <a:ext cx="8229240" cy="1144800"/>
           </a:xfrm>
           <a:prstGeom prst="rect">
             <a:avLst/>
@@ -797,23 +769,24 @@
         <p:txBody>
           <a:bodyPr lIns="0" rIns="0" tIns="0" bIns="0" anchor="ctr"/>
           <a:p>
-            <a:endParaRPr b="0" lang="en-US" sz="1800" spc="-1" strike="noStrike">
-              <a:solidFill>
-                <a:srgbClr val="000000"/>
-              </a:solidFill>
-              <a:uFill>
-                <a:solidFill>
-                  <a:srgbClr val="ffffff"/>
-                </a:solidFill>
-              </a:uFill>
-              <a:latin typeface="Calibri"/>
-            </a:endParaRPr>
-          </a:p>
-        </p:txBody>
-      </p:sp>
-      <p:sp>
-        <p:nvSpPr>
-          <p:cNvPr id="35" name="PlaceHolder 2"/>
+            <a:pPr algn="ctr"/>
+            <a:endParaRPr b="0" lang="de-DE" sz="4400" spc="-1" strike="noStrike">
+              <a:solidFill>
+                <a:srgbClr val="000000"/>
+              </a:solidFill>
+              <a:uFill>
+                <a:solidFill>
+                  <a:srgbClr val="ffffff"/>
+                </a:solidFill>
+              </a:uFill>
+              <a:latin typeface="Arial"/>
+            </a:endParaRPr>
+          </a:p>
+        </p:txBody>
+      </p:sp>
+      <p:sp>
+        <p:nvSpPr>
+          <p:cNvPr id="30" name="PlaceHolder 2"/>
           <p:cNvSpPr>
             <a:spLocks noGrp="1"/>
           </p:cNvSpPr>
@@ -823,8 +796,8 @@
         </p:nvSpPr>
         <p:spPr>
           <a:xfrm>
-            <a:off x="457200" y="1600200"/>
-            <a:ext cx="2649600" cy="2158560"/>
+            <a:off x="457200" y="1604520"/>
+            <a:ext cx="2649600" cy="1896840"/>
           </a:xfrm>
           <a:prstGeom prst="rect">
             <a:avLst/>
@@ -833,23 +806,23 @@
         <p:txBody>
           <a:bodyPr lIns="0" rIns="0" tIns="0" bIns="0"/>
           <a:p>
-            <a:endParaRPr b="0" lang="en-US" sz="3200" spc="-1" strike="noStrike">
-              <a:solidFill>
-                <a:srgbClr val="000000"/>
-              </a:solidFill>
-              <a:uFill>
-                <a:solidFill>
-                  <a:srgbClr val="ffffff"/>
-                </a:solidFill>
-              </a:uFill>
-              <a:latin typeface="Calibri"/>
-            </a:endParaRPr>
-          </a:p>
-        </p:txBody>
-      </p:sp>
-      <p:sp>
-        <p:nvSpPr>
-          <p:cNvPr id="36" name="PlaceHolder 3"/>
+            <a:endParaRPr b="0" lang="de-DE" sz="3200" spc="-1" strike="noStrike">
+              <a:solidFill>
+                <a:srgbClr val="000000"/>
+              </a:solidFill>
+              <a:uFill>
+                <a:solidFill>
+                  <a:srgbClr val="ffffff"/>
+                </a:solidFill>
+              </a:uFill>
+              <a:latin typeface="Arial"/>
+            </a:endParaRPr>
+          </a:p>
+        </p:txBody>
+      </p:sp>
+      <p:sp>
+        <p:nvSpPr>
+          <p:cNvPr id="31" name="PlaceHolder 3"/>
           <p:cNvSpPr>
             <a:spLocks noGrp="1"/>
           </p:cNvSpPr>
@@ -859,8 +832,8 @@
         </p:nvSpPr>
         <p:spPr>
           <a:xfrm>
-            <a:off x="3239640" y="1600200"/>
-            <a:ext cx="2649600" cy="2158560"/>
+            <a:off x="3239640" y="1604520"/>
+            <a:ext cx="2649600" cy="1896840"/>
           </a:xfrm>
           <a:prstGeom prst="rect">
             <a:avLst/>
@@ -869,23 +842,23 @@
         <p:txBody>
           <a:bodyPr lIns="0" rIns="0" tIns="0" bIns="0"/>
           <a:p>
-            <a:endParaRPr b="0" lang="en-US" sz="3200" spc="-1" strike="noStrike">
-              <a:solidFill>
-                <a:srgbClr val="000000"/>
-              </a:solidFill>
-              <a:uFill>
-                <a:solidFill>
-                  <a:srgbClr val="ffffff"/>
-                </a:solidFill>
-              </a:uFill>
-              <a:latin typeface="Calibri"/>
-            </a:endParaRPr>
-          </a:p>
-        </p:txBody>
-      </p:sp>
-      <p:sp>
-        <p:nvSpPr>
-          <p:cNvPr id="37" name="PlaceHolder 4"/>
+            <a:endParaRPr b="0" lang="de-DE" sz="3200" spc="-1" strike="noStrike">
+              <a:solidFill>
+                <a:srgbClr val="000000"/>
+              </a:solidFill>
+              <a:uFill>
+                <a:solidFill>
+                  <a:srgbClr val="ffffff"/>
+                </a:solidFill>
+              </a:uFill>
+              <a:latin typeface="Arial"/>
+            </a:endParaRPr>
+          </a:p>
+        </p:txBody>
+      </p:sp>
+      <p:sp>
+        <p:nvSpPr>
+          <p:cNvPr id="32" name="PlaceHolder 4"/>
           <p:cNvSpPr>
             <a:spLocks noGrp="1"/>
           </p:cNvSpPr>
@@ -895,8 +868,8 @@
         </p:nvSpPr>
         <p:spPr>
           <a:xfrm>
-            <a:off x="6022080" y="1600200"/>
-            <a:ext cx="2649600" cy="2158560"/>
+            <a:off x="6022080" y="1604520"/>
+            <a:ext cx="2649600" cy="1896840"/>
           </a:xfrm>
           <a:prstGeom prst="rect">
             <a:avLst/>
@@ -905,23 +878,23 @@
         <p:txBody>
           <a:bodyPr lIns="0" rIns="0" tIns="0" bIns="0"/>
           <a:p>
-            <a:endParaRPr b="0" lang="en-US" sz="3200" spc="-1" strike="noStrike">
-              <a:solidFill>
-                <a:srgbClr val="000000"/>
-              </a:solidFill>
-              <a:uFill>
-                <a:solidFill>
-                  <a:srgbClr val="ffffff"/>
-                </a:solidFill>
-              </a:uFill>
-              <a:latin typeface="Calibri"/>
-            </a:endParaRPr>
-          </a:p>
-        </p:txBody>
-      </p:sp>
-      <p:sp>
-        <p:nvSpPr>
-          <p:cNvPr id="38" name="PlaceHolder 5"/>
+            <a:endParaRPr b="0" lang="de-DE" sz="3200" spc="-1" strike="noStrike">
+              <a:solidFill>
+                <a:srgbClr val="000000"/>
+              </a:solidFill>
+              <a:uFill>
+                <a:solidFill>
+                  <a:srgbClr val="ffffff"/>
+                </a:solidFill>
+              </a:uFill>
+              <a:latin typeface="Arial"/>
+            </a:endParaRPr>
+          </a:p>
+        </p:txBody>
+      </p:sp>
+      <p:sp>
+        <p:nvSpPr>
+          <p:cNvPr id="33" name="PlaceHolder 5"/>
           <p:cNvSpPr>
             <a:spLocks noGrp="1"/>
           </p:cNvSpPr>
@@ -931,8 +904,8 @@
         </p:nvSpPr>
         <p:spPr>
           <a:xfrm>
-            <a:off x="6022080" y="3964320"/>
-            <a:ext cx="2649600" cy="2158560"/>
+            <a:off x="6022080" y="3682080"/>
+            <a:ext cx="2649600" cy="1896840"/>
           </a:xfrm>
           <a:prstGeom prst="rect">
             <a:avLst/>
@@ -941,23 +914,23 @@
         <p:txBody>
           <a:bodyPr lIns="0" rIns="0" tIns="0" bIns="0"/>
           <a:p>
-            <a:endParaRPr b="0" lang="en-US" sz="3200" spc="-1" strike="noStrike">
-              <a:solidFill>
-                <a:srgbClr val="000000"/>
-              </a:solidFill>
-              <a:uFill>
-                <a:solidFill>
-                  <a:srgbClr val="ffffff"/>
-                </a:solidFill>
-              </a:uFill>
-              <a:latin typeface="Calibri"/>
-            </a:endParaRPr>
-          </a:p>
-        </p:txBody>
-      </p:sp>
-      <p:sp>
-        <p:nvSpPr>
-          <p:cNvPr id="39" name="PlaceHolder 6"/>
+            <a:endParaRPr b="0" lang="de-DE" sz="3200" spc="-1" strike="noStrike">
+              <a:solidFill>
+                <a:srgbClr val="000000"/>
+              </a:solidFill>
+              <a:uFill>
+                <a:solidFill>
+                  <a:srgbClr val="ffffff"/>
+                </a:solidFill>
+              </a:uFill>
+              <a:latin typeface="Arial"/>
+            </a:endParaRPr>
+          </a:p>
+        </p:txBody>
+      </p:sp>
+      <p:sp>
+        <p:nvSpPr>
+          <p:cNvPr id="34" name="PlaceHolder 6"/>
           <p:cNvSpPr>
             <a:spLocks noGrp="1"/>
           </p:cNvSpPr>
@@ -967,8 +940,8 @@
         </p:nvSpPr>
         <p:spPr>
           <a:xfrm>
-            <a:off x="3239640" y="3964320"/>
-            <a:ext cx="2649600" cy="2158560"/>
+            <a:off x="3239640" y="3682080"/>
+            <a:ext cx="2649600" cy="1896840"/>
           </a:xfrm>
           <a:prstGeom prst="rect">
             <a:avLst/>
@@ -977,23 +950,23 @@
         <p:txBody>
           <a:bodyPr lIns="0" rIns="0" tIns="0" bIns="0"/>
           <a:p>
-            <a:endParaRPr b="0" lang="en-US" sz="3200" spc="-1" strike="noStrike">
-              <a:solidFill>
-                <a:srgbClr val="000000"/>
-              </a:solidFill>
-              <a:uFill>
-                <a:solidFill>
-                  <a:srgbClr val="ffffff"/>
-                </a:solidFill>
-              </a:uFill>
-              <a:latin typeface="Calibri"/>
-            </a:endParaRPr>
-          </a:p>
-        </p:txBody>
-      </p:sp>
-      <p:sp>
-        <p:nvSpPr>
-          <p:cNvPr id="40" name="PlaceHolder 7"/>
+            <a:endParaRPr b="0" lang="de-DE" sz="3200" spc="-1" strike="noStrike">
+              <a:solidFill>
+                <a:srgbClr val="000000"/>
+              </a:solidFill>
+              <a:uFill>
+                <a:solidFill>
+                  <a:srgbClr val="ffffff"/>
+                </a:solidFill>
+              </a:uFill>
+              <a:latin typeface="Arial"/>
+            </a:endParaRPr>
+          </a:p>
+        </p:txBody>
+      </p:sp>
+      <p:sp>
+        <p:nvSpPr>
+          <p:cNvPr id="35" name="PlaceHolder 7"/>
           <p:cNvSpPr>
             <a:spLocks noGrp="1"/>
           </p:cNvSpPr>
@@ -1003,8 +976,8 @@
         </p:nvSpPr>
         <p:spPr>
           <a:xfrm>
-            <a:off x="457200" y="3964320"/>
-            <a:ext cx="2649600" cy="2158560"/>
+            <a:off x="457200" y="3682080"/>
+            <a:ext cx="2649600" cy="1896840"/>
           </a:xfrm>
           <a:prstGeom prst="rect">
             <a:avLst/>
@@ -1013,16 +986,16 @@
         <p:txBody>
           <a:bodyPr lIns="0" rIns="0" tIns="0" bIns="0"/>
           <a:p>
-            <a:endParaRPr b="0" lang="en-US" sz="3200" spc="-1" strike="noStrike">
-              <a:solidFill>
-                <a:srgbClr val="000000"/>
-              </a:solidFill>
-              <a:uFill>
-                <a:solidFill>
-                  <a:srgbClr val="ffffff"/>
-                </a:solidFill>
-              </a:uFill>
-              <a:latin typeface="Calibri"/>
+            <a:endParaRPr b="0" lang="de-DE" sz="3200" spc="-1" strike="noStrike">
+              <a:solidFill>
+                <a:srgbClr val="000000"/>
+              </a:solidFill>
+              <a:uFill>
+                <a:solidFill>
+                  <a:srgbClr val="ffffff"/>
+                </a:solidFill>
+              </a:uFill>
+              <a:latin typeface="Arial"/>
             </a:endParaRPr>
           </a:p>
         </p:txBody>
@@ -1051,7 +1024,7 @@
       </p:grpSpPr>
       <p:sp>
         <p:nvSpPr>
-          <p:cNvPr id="5" name="PlaceHolder 1"/>
+          <p:cNvPr id="0" name="PlaceHolder 1"/>
           <p:cNvSpPr>
             <a:spLocks noGrp="1"/>
           </p:cNvSpPr>
@@ -1061,8 +1034,8 @@
         </p:nvSpPr>
         <p:spPr>
           <a:xfrm>
-            <a:off x="457200" y="274680"/>
-            <a:ext cx="8229240" cy="1142640"/>
+            <a:off x="457200" y="273600"/>
+            <a:ext cx="8229240" cy="1144800"/>
           </a:xfrm>
           <a:prstGeom prst="rect">
             <a:avLst/>
@@ -1071,23 +1044,24 @@
         <p:txBody>
           <a:bodyPr lIns="0" rIns="0" tIns="0" bIns="0" anchor="ctr"/>
           <a:p>
-            <a:endParaRPr b="0" lang="en-US" sz="1800" spc="-1" strike="noStrike">
-              <a:solidFill>
-                <a:srgbClr val="000000"/>
-              </a:solidFill>
-              <a:uFill>
-                <a:solidFill>
-                  <a:srgbClr val="ffffff"/>
-                </a:solidFill>
-              </a:uFill>
-              <a:latin typeface="Calibri"/>
-            </a:endParaRPr>
-          </a:p>
-        </p:txBody>
-      </p:sp>
-      <p:sp>
-        <p:nvSpPr>
-          <p:cNvPr id="6" name="PlaceHolder 2"/>
+            <a:pPr algn="ctr"/>
+            <a:endParaRPr b="0" lang="de-DE" sz="4400" spc="-1" strike="noStrike">
+              <a:solidFill>
+                <a:srgbClr val="000000"/>
+              </a:solidFill>
+              <a:uFill>
+                <a:solidFill>
+                  <a:srgbClr val="ffffff"/>
+                </a:solidFill>
+              </a:uFill>
+              <a:latin typeface="Arial"/>
+            </a:endParaRPr>
+          </a:p>
+        </p:txBody>
+      </p:sp>
+      <p:sp>
+        <p:nvSpPr>
+          <p:cNvPr id="1" name="PlaceHolder 2"/>
           <p:cNvSpPr>
             <a:spLocks noGrp="1"/>
           </p:cNvSpPr>
@@ -1097,8 +1071,8 @@
         </p:nvSpPr>
         <p:spPr>
           <a:xfrm>
-            <a:off x="457200" y="1600200"/>
-            <a:ext cx="8229240" cy="4525560"/>
+            <a:off x="457200" y="1604520"/>
+            <a:ext cx="8229240" cy="3977280"/>
           </a:xfrm>
           <a:prstGeom prst="rect">
             <a:avLst/>
@@ -1146,7 +1120,7 @@
       </p:grpSpPr>
       <p:sp>
         <p:nvSpPr>
-          <p:cNvPr id="7" name="PlaceHolder 1"/>
+          <p:cNvPr id="2" name="PlaceHolder 1"/>
           <p:cNvSpPr>
             <a:spLocks noGrp="1"/>
           </p:cNvSpPr>
@@ -1156,8 +1130,8 @@
         </p:nvSpPr>
         <p:spPr>
           <a:xfrm>
-            <a:off x="457200" y="274680"/>
-            <a:ext cx="8229240" cy="1142640"/>
+            <a:off x="457200" y="273600"/>
+            <a:ext cx="8229240" cy="1144800"/>
           </a:xfrm>
           <a:prstGeom prst="rect">
             <a:avLst/>
@@ -1166,23 +1140,24 @@
         <p:txBody>
           <a:bodyPr lIns="0" rIns="0" tIns="0" bIns="0" anchor="ctr"/>
           <a:p>
-            <a:endParaRPr b="0" lang="en-US" sz="1800" spc="-1" strike="noStrike">
-              <a:solidFill>
-                <a:srgbClr val="000000"/>
-              </a:solidFill>
-              <a:uFill>
-                <a:solidFill>
-                  <a:srgbClr val="ffffff"/>
-                </a:solidFill>
-              </a:uFill>
-              <a:latin typeface="Calibri"/>
-            </a:endParaRPr>
-          </a:p>
-        </p:txBody>
-      </p:sp>
-      <p:sp>
-        <p:nvSpPr>
-          <p:cNvPr id="8" name="PlaceHolder 2"/>
+            <a:pPr algn="ctr"/>
+            <a:endParaRPr b="0" lang="de-DE" sz="4400" spc="-1" strike="noStrike">
+              <a:solidFill>
+                <a:srgbClr val="000000"/>
+              </a:solidFill>
+              <a:uFill>
+                <a:solidFill>
+                  <a:srgbClr val="ffffff"/>
+                </a:solidFill>
+              </a:uFill>
+              <a:latin typeface="Arial"/>
+            </a:endParaRPr>
+          </a:p>
+        </p:txBody>
+      </p:sp>
+      <p:sp>
+        <p:nvSpPr>
+          <p:cNvPr id="3" name="PlaceHolder 2"/>
           <p:cNvSpPr>
             <a:spLocks noGrp="1"/>
           </p:cNvSpPr>
@@ -1192,8 +1167,8 @@
         </p:nvSpPr>
         <p:spPr>
           <a:xfrm>
-            <a:off x="457200" y="1600200"/>
-            <a:ext cx="8229240" cy="4525560"/>
+            <a:off x="457200" y="1604520"/>
+            <a:ext cx="8229240" cy="3977280"/>
           </a:xfrm>
           <a:prstGeom prst="rect">
             <a:avLst/>
@@ -1202,16 +1177,16 @@
         <p:txBody>
           <a:bodyPr lIns="0" rIns="0" tIns="0" bIns="0"/>
           <a:p>
-            <a:endParaRPr b="0" lang="en-US" sz="3200" spc="-1" strike="noStrike">
-              <a:solidFill>
-                <a:srgbClr val="000000"/>
-              </a:solidFill>
-              <a:uFill>
-                <a:solidFill>
-                  <a:srgbClr val="ffffff"/>
-                </a:solidFill>
-              </a:uFill>
-              <a:latin typeface="Calibri"/>
+            <a:endParaRPr b="0" lang="de-DE" sz="3200" spc="-1" strike="noStrike">
+              <a:solidFill>
+                <a:srgbClr val="000000"/>
+              </a:solidFill>
+              <a:uFill>
+                <a:solidFill>
+                  <a:srgbClr val="ffffff"/>
+                </a:solidFill>
+              </a:uFill>
+              <a:latin typeface="Arial"/>
             </a:endParaRPr>
           </a:p>
         </p:txBody>
@@ -1240,7 +1215,7 @@
       </p:grpSpPr>
       <p:sp>
         <p:nvSpPr>
-          <p:cNvPr id="9" name="PlaceHolder 1"/>
+          <p:cNvPr id="4" name="PlaceHolder 1"/>
           <p:cNvSpPr>
             <a:spLocks noGrp="1"/>
           </p:cNvSpPr>
@@ -1250,8 +1225,8 @@
         </p:nvSpPr>
         <p:spPr>
           <a:xfrm>
-            <a:off x="457200" y="274680"/>
-            <a:ext cx="8229240" cy="1142640"/>
+            <a:off x="457200" y="273600"/>
+            <a:ext cx="8229240" cy="1144800"/>
           </a:xfrm>
           <a:prstGeom prst="rect">
             <a:avLst/>
@@ -1260,23 +1235,24 @@
         <p:txBody>
           <a:bodyPr lIns="0" rIns="0" tIns="0" bIns="0" anchor="ctr"/>
           <a:p>
-            <a:endParaRPr b="0" lang="en-US" sz="1800" spc="-1" strike="noStrike">
-              <a:solidFill>
-                <a:srgbClr val="000000"/>
-              </a:solidFill>
-              <a:uFill>
-                <a:solidFill>
-                  <a:srgbClr val="ffffff"/>
-                </a:solidFill>
-              </a:uFill>
-              <a:latin typeface="Calibri"/>
-            </a:endParaRPr>
-          </a:p>
-        </p:txBody>
-      </p:sp>
-      <p:sp>
-        <p:nvSpPr>
-          <p:cNvPr id="10" name="PlaceHolder 2"/>
+            <a:pPr algn="ctr"/>
+            <a:endParaRPr b="0" lang="de-DE" sz="4400" spc="-1" strike="noStrike">
+              <a:solidFill>
+                <a:srgbClr val="000000"/>
+              </a:solidFill>
+              <a:uFill>
+                <a:solidFill>
+                  <a:srgbClr val="ffffff"/>
+                </a:solidFill>
+              </a:uFill>
+              <a:latin typeface="Arial"/>
+            </a:endParaRPr>
+          </a:p>
+        </p:txBody>
+      </p:sp>
+      <p:sp>
+        <p:nvSpPr>
+          <p:cNvPr id="5" name="PlaceHolder 2"/>
           <p:cNvSpPr>
             <a:spLocks noGrp="1"/>
           </p:cNvSpPr>
@@ -1286,8 +1262,8 @@
         </p:nvSpPr>
         <p:spPr>
           <a:xfrm>
-            <a:off x="457200" y="1600200"/>
-            <a:ext cx="4015800" cy="4525560"/>
+            <a:off x="457200" y="1604520"/>
+            <a:ext cx="4015800" cy="3977280"/>
           </a:xfrm>
           <a:prstGeom prst="rect">
             <a:avLst/>
@@ -1296,23 +1272,23 @@
         <p:txBody>
           <a:bodyPr lIns="0" rIns="0" tIns="0" bIns="0"/>
           <a:p>
-            <a:endParaRPr b="0" lang="en-US" sz="3200" spc="-1" strike="noStrike">
-              <a:solidFill>
-                <a:srgbClr val="000000"/>
-              </a:solidFill>
-              <a:uFill>
-                <a:solidFill>
-                  <a:srgbClr val="ffffff"/>
-                </a:solidFill>
-              </a:uFill>
-              <a:latin typeface="Calibri"/>
-            </a:endParaRPr>
-          </a:p>
-        </p:txBody>
-      </p:sp>
-      <p:sp>
-        <p:nvSpPr>
-          <p:cNvPr id="11" name="PlaceHolder 3"/>
+            <a:endParaRPr b="0" lang="de-DE" sz="3200" spc="-1" strike="noStrike">
+              <a:solidFill>
+                <a:srgbClr val="000000"/>
+              </a:solidFill>
+              <a:uFill>
+                <a:solidFill>
+                  <a:srgbClr val="ffffff"/>
+                </a:solidFill>
+              </a:uFill>
+              <a:latin typeface="Arial"/>
+            </a:endParaRPr>
+          </a:p>
+        </p:txBody>
+      </p:sp>
+      <p:sp>
+        <p:nvSpPr>
+          <p:cNvPr id="6" name="PlaceHolder 3"/>
           <p:cNvSpPr>
             <a:spLocks noGrp="1"/>
           </p:cNvSpPr>
@@ -1322,8 +1298,8 @@
         </p:nvSpPr>
         <p:spPr>
           <a:xfrm>
-            <a:off x="4674240" y="1600200"/>
-            <a:ext cx="4015800" cy="4525560"/>
+            <a:off x="4674240" y="1604520"/>
+            <a:ext cx="4015800" cy="3977280"/>
           </a:xfrm>
           <a:prstGeom prst="rect">
             <a:avLst/>
@@ -1332,16 +1308,16 @@
         <p:txBody>
           <a:bodyPr lIns="0" rIns="0" tIns="0" bIns="0"/>
           <a:p>
-            <a:endParaRPr b="0" lang="en-US" sz="3200" spc="-1" strike="noStrike">
-              <a:solidFill>
-                <a:srgbClr val="000000"/>
-              </a:solidFill>
-              <a:uFill>
-                <a:solidFill>
-                  <a:srgbClr val="ffffff"/>
-                </a:solidFill>
-              </a:uFill>
-              <a:latin typeface="Calibri"/>
+            <a:endParaRPr b="0" lang="de-DE" sz="3200" spc="-1" strike="noStrike">
+              <a:solidFill>
+                <a:srgbClr val="000000"/>
+              </a:solidFill>
+              <a:uFill>
+                <a:solidFill>
+                  <a:srgbClr val="ffffff"/>
+                </a:solidFill>
+              </a:uFill>
+              <a:latin typeface="Arial"/>
             </a:endParaRPr>
           </a:p>
         </p:txBody>
@@ -1370,7 +1346,7 @@
       </p:grpSpPr>
       <p:sp>
         <p:nvSpPr>
-          <p:cNvPr id="12" name="PlaceHolder 1"/>
+          <p:cNvPr id="7" name="PlaceHolder 1"/>
           <p:cNvSpPr>
             <a:spLocks noGrp="1"/>
           </p:cNvSpPr>
@@ -1380,8 +1356,8 @@
         </p:nvSpPr>
         <p:spPr>
           <a:xfrm>
-            <a:off x="457200" y="274680"/>
-            <a:ext cx="8229240" cy="1142640"/>
+            <a:off x="457200" y="273600"/>
+            <a:ext cx="8229240" cy="1144800"/>
           </a:xfrm>
           <a:prstGeom prst="rect">
             <a:avLst/>
@@ -1390,16 +1366,17 @@
         <p:txBody>
           <a:bodyPr lIns="0" rIns="0" tIns="0" bIns="0" anchor="ctr"/>
           <a:p>
-            <a:endParaRPr b="0" lang="en-US" sz="1800" spc="-1" strike="noStrike">
-              <a:solidFill>
-                <a:srgbClr val="000000"/>
-              </a:solidFill>
-              <a:uFill>
-                <a:solidFill>
-                  <a:srgbClr val="ffffff"/>
-                </a:solidFill>
-              </a:uFill>
-              <a:latin typeface="Calibri"/>
+            <a:pPr algn="ctr"/>
+            <a:endParaRPr b="0" lang="de-DE" sz="4400" spc="-1" strike="noStrike">
+              <a:solidFill>
+                <a:srgbClr val="000000"/>
+              </a:solidFill>
+              <a:uFill>
+                <a:solidFill>
+                  <a:srgbClr val="ffffff"/>
+                </a:solidFill>
+              </a:uFill>
+              <a:latin typeface="Arial"/>
             </a:endParaRPr>
           </a:p>
         </p:txBody>
@@ -1428,7 +1405,7 @@
       </p:grpSpPr>
       <p:sp>
         <p:nvSpPr>
-          <p:cNvPr id="13" name="PlaceHolder 1"/>
+          <p:cNvPr id="8" name="PlaceHolder 1"/>
           <p:cNvSpPr>
             <a:spLocks noGrp="1"/>
           </p:cNvSpPr>
@@ -1438,8 +1415,8 @@
         </p:nvSpPr>
         <p:spPr>
           <a:xfrm>
-            <a:off x="457200" y="274680"/>
-            <a:ext cx="8229240" cy="5297760"/>
+            <a:off x="457200" y="273600"/>
+            <a:ext cx="8229240" cy="5307840"/>
           </a:xfrm>
           <a:prstGeom prst="rect">
             <a:avLst/>
@@ -1487,7 +1464,7 @@
       </p:grpSpPr>
       <p:sp>
         <p:nvSpPr>
-          <p:cNvPr id="14" name="PlaceHolder 1"/>
+          <p:cNvPr id="9" name="PlaceHolder 1"/>
           <p:cNvSpPr>
             <a:spLocks noGrp="1"/>
           </p:cNvSpPr>
@@ -1497,8 +1474,8 @@
         </p:nvSpPr>
         <p:spPr>
           <a:xfrm>
-            <a:off x="457200" y="274680"/>
-            <a:ext cx="8229240" cy="1142640"/>
+            <a:off x="457200" y="273600"/>
+            <a:ext cx="8229240" cy="1144800"/>
           </a:xfrm>
           <a:prstGeom prst="rect">
             <a:avLst/>
@@ -1507,23 +1484,24 @@
         <p:txBody>
           <a:bodyPr lIns="0" rIns="0" tIns="0" bIns="0" anchor="ctr"/>
           <a:p>
-            <a:endParaRPr b="0" lang="en-US" sz="1800" spc="-1" strike="noStrike">
-              <a:solidFill>
-                <a:srgbClr val="000000"/>
-              </a:solidFill>
-              <a:uFill>
-                <a:solidFill>
-                  <a:srgbClr val="ffffff"/>
-                </a:solidFill>
-              </a:uFill>
-              <a:latin typeface="Calibri"/>
-            </a:endParaRPr>
-          </a:p>
-        </p:txBody>
-      </p:sp>
-      <p:sp>
-        <p:nvSpPr>
-          <p:cNvPr id="15" name="PlaceHolder 2"/>
+            <a:pPr algn="ctr"/>
+            <a:endParaRPr b="0" lang="de-DE" sz="4400" spc="-1" strike="noStrike">
+              <a:solidFill>
+                <a:srgbClr val="000000"/>
+              </a:solidFill>
+              <a:uFill>
+                <a:solidFill>
+                  <a:srgbClr val="ffffff"/>
+                </a:solidFill>
+              </a:uFill>
+              <a:latin typeface="Arial"/>
+            </a:endParaRPr>
+          </a:p>
+        </p:txBody>
+      </p:sp>
+      <p:sp>
+        <p:nvSpPr>
+          <p:cNvPr id="10" name="PlaceHolder 2"/>
           <p:cNvSpPr>
             <a:spLocks noGrp="1"/>
           </p:cNvSpPr>
@@ -1533,8 +1511,8 @@
         </p:nvSpPr>
         <p:spPr>
           <a:xfrm>
-            <a:off x="457200" y="1600200"/>
-            <a:ext cx="4015800" cy="2158560"/>
+            <a:off x="457200" y="1604520"/>
+            <a:ext cx="4015800" cy="1896840"/>
           </a:xfrm>
           <a:prstGeom prst="rect">
             <a:avLst/>
@@ -1543,23 +1521,23 @@
         <p:txBody>
           <a:bodyPr lIns="0" rIns="0" tIns="0" bIns="0"/>
           <a:p>
-            <a:endParaRPr b="0" lang="en-US" sz="3200" spc="-1" strike="noStrike">
-              <a:solidFill>
-                <a:srgbClr val="000000"/>
-              </a:solidFill>
-              <a:uFill>
-                <a:solidFill>
-                  <a:srgbClr val="ffffff"/>
-                </a:solidFill>
-              </a:uFill>
-              <a:latin typeface="Calibri"/>
-            </a:endParaRPr>
-          </a:p>
-        </p:txBody>
-      </p:sp>
-      <p:sp>
-        <p:nvSpPr>
-          <p:cNvPr id="16" name="PlaceHolder 3"/>
+            <a:endParaRPr b="0" lang="de-DE" sz="3200" spc="-1" strike="noStrike">
+              <a:solidFill>
+                <a:srgbClr val="000000"/>
+              </a:solidFill>
+              <a:uFill>
+                <a:solidFill>
+                  <a:srgbClr val="ffffff"/>
+                </a:solidFill>
+              </a:uFill>
+              <a:latin typeface="Arial"/>
+            </a:endParaRPr>
+          </a:p>
+        </p:txBody>
+      </p:sp>
+      <p:sp>
+        <p:nvSpPr>
+          <p:cNvPr id="11" name="PlaceHolder 3"/>
           <p:cNvSpPr>
             <a:spLocks noGrp="1"/>
           </p:cNvSpPr>
@@ -1569,8 +1547,8 @@
         </p:nvSpPr>
         <p:spPr>
           <a:xfrm>
-            <a:off x="457200" y="3964320"/>
-            <a:ext cx="4015800" cy="2158560"/>
+            <a:off x="457200" y="3682080"/>
+            <a:ext cx="4015800" cy="1896840"/>
           </a:xfrm>
           <a:prstGeom prst="rect">
             <a:avLst/>
@@ -1579,23 +1557,23 @@
         <p:txBody>
           <a:bodyPr lIns="0" rIns="0" tIns="0" bIns="0"/>
           <a:p>
-            <a:endParaRPr b="0" lang="en-US" sz="3200" spc="-1" strike="noStrike">
-              <a:solidFill>
-                <a:srgbClr val="000000"/>
-              </a:solidFill>
-              <a:uFill>
-                <a:solidFill>
-                  <a:srgbClr val="ffffff"/>
-                </a:solidFill>
-              </a:uFill>
-              <a:latin typeface="Calibri"/>
-            </a:endParaRPr>
-          </a:p>
-        </p:txBody>
-      </p:sp>
-      <p:sp>
-        <p:nvSpPr>
-          <p:cNvPr id="17" name="PlaceHolder 4"/>
+            <a:endParaRPr b="0" lang="de-DE" sz="3200" spc="-1" strike="noStrike">
+              <a:solidFill>
+                <a:srgbClr val="000000"/>
+              </a:solidFill>
+              <a:uFill>
+                <a:solidFill>
+                  <a:srgbClr val="ffffff"/>
+                </a:solidFill>
+              </a:uFill>
+              <a:latin typeface="Arial"/>
+            </a:endParaRPr>
+          </a:p>
+        </p:txBody>
+      </p:sp>
+      <p:sp>
+        <p:nvSpPr>
+          <p:cNvPr id="12" name="PlaceHolder 4"/>
           <p:cNvSpPr>
             <a:spLocks noGrp="1"/>
           </p:cNvSpPr>
@@ -1605,8 +1583,8 @@
         </p:nvSpPr>
         <p:spPr>
           <a:xfrm>
-            <a:off x="4674240" y="1600200"/>
-            <a:ext cx="4015800" cy="4525560"/>
+            <a:off x="4674240" y="1604520"/>
+            <a:ext cx="4015800" cy="3977280"/>
           </a:xfrm>
           <a:prstGeom prst="rect">
             <a:avLst/>
@@ -1615,16 +1593,16 @@
         <p:txBody>
           <a:bodyPr lIns="0" rIns="0" tIns="0" bIns="0"/>
           <a:p>
-            <a:endParaRPr b="0" lang="en-US" sz="3200" spc="-1" strike="noStrike">
-              <a:solidFill>
-                <a:srgbClr val="000000"/>
-              </a:solidFill>
-              <a:uFill>
-                <a:solidFill>
-                  <a:srgbClr val="ffffff"/>
-                </a:solidFill>
-              </a:uFill>
-              <a:latin typeface="Calibri"/>
+            <a:endParaRPr b="0" lang="de-DE" sz="3200" spc="-1" strike="noStrike">
+              <a:solidFill>
+                <a:srgbClr val="000000"/>
+              </a:solidFill>
+              <a:uFill>
+                <a:solidFill>
+                  <a:srgbClr val="ffffff"/>
+                </a:solidFill>
+              </a:uFill>
+              <a:latin typeface="Arial"/>
             </a:endParaRPr>
           </a:p>
         </p:txBody>
@@ -1653,7 +1631,7 @@
       </p:grpSpPr>
       <p:sp>
         <p:nvSpPr>
-          <p:cNvPr id="18" name="PlaceHolder 1"/>
+          <p:cNvPr id="13" name="PlaceHolder 1"/>
           <p:cNvSpPr>
             <a:spLocks noGrp="1"/>
           </p:cNvSpPr>
@@ -1663,8 +1641,8 @@
         </p:nvSpPr>
         <p:spPr>
           <a:xfrm>
-            <a:off x="457200" y="274680"/>
-            <a:ext cx="8229240" cy="1142640"/>
+            <a:off x="457200" y="273600"/>
+            <a:ext cx="8229240" cy="1144800"/>
           </a:xfrm>
           <a:prstGeom prst="rect">
             <a:avLst/>
@@ -1673,23 +1651,24 @@
         <p:txBody>
           <a:bodyPr lIns="0" rIns="0" tIns="0" bIns="0" anchor="ctr"/>
           <a:p>
-            <a:endParaRPr b="0" lang="en-US" sz="1800" spc="-1" strike="noStrike">
-              <a:solidFill>
-                <a:srgbClr val="000000"/>
-              </a:solidFill>
-              <a:uFill>
-                <a:solidFill>
-                  <a:srgbClr val="ffffff"/>
-                </a:solidFill>
-              </a:uFill>
-              <a:latin typeface="Calibri"/>
-            </a:endParaRPr>
-          </a:p>
-        </p:txBody>
-      </p:sp>
-      <p:sp>
-        <p:nvSpPr>
-          <p:cNvPr id="19" name="PlaceHolder 2"/>
+            <a:pPr algn="ctr"/>
+            <a:endParaRPr b="0" lang="de-DE" sz="4400" spc="-1" strike="noStrike">
+              <a:solidFill>
+                <a:srgbClr val="000000"/>
+              </a:solidFill>
+              <a:uFill>
+                <a:solidFill>
+                  <a:srgbClr val="ffffff"/>
+                </a:solidFill>
+              </a:uFill>
+              <a:latin typeface="Arial"/>
+            </a:endParaRPr>
+          </a:p>
+        </p:txBody>
+      </p:sp>
+      <p:sp>
+        <p:nvSpPr>
+          <p:cNvPr id="14" name="PlaceHolder 2"/>
           <p:cNvSpPr>
             <a:spLocks noGrp="1"/>
           </p:cNvSpPr>
@@ -1699,8 +1678,8 @@
         </p:nvSpPr>
         <p:spPr>
           <a:xfrm>
-            <a:off x="457200" y="1600200"/>
-            <a:ext cx="4015800" cy="4525560"/>
+            <a:off x="457200" y="1604520"/>
+            <a:ext cx="4015800" cy="3977280"/>
           </a:xfrm>
           <a:prstGeom prst="rect">
             <a:avLst/>
@@ -1709,23 +1688,23 @@
         <p:txBody>
           <a:bodyPr lIns="0" rIns="0" tIns="0" bIns="0"/>
           <a:p>
-            <a:endParaRPr b="0" lang="en-US" sz="3200" spc="-1" strike="noStrike">
-              <a:solidFill>
-                <a:srgbClr val="000000"/>
-              </a:solidFill>
-              <a:uFill>
-                <a:solidFill>
-                  <a:srgbClr val="ffffff"/>
-                </a:solidFill>
-              </a:uFill>
-              <a:latin typeface="Calibri"/>
-            </a:endParaRPr>
-          </a:p>
-        </p:txBody>
-      </p:sp>
-      <p:sp>
-        <p:nvSpPr>
-          <p:cNvPr id="20" name="PlaceHolder 3"/>
+            <a:endParaRPr b="0" lang="de-DE" sz="3200" spc="-1" strike="noStrike">
+              <a:solidFill>
+                <a:srgbClr val="000000"/>
+              </a:solidFill>
+              <a:uFill>
+                <a:solidFill>
+                  <a:srgbClr val="ffffff"/>
+                </a:solidFill>
+              </a:uFill>
+              <a:latin typeface="Arial"/>
+            </a:endParaRPr>
+          </a:p>
+        </p:txBody>
+      </p:sp>
+      <p:sp>
+        <p:nvSpPr>
+          <p:cNvPr id="15" name="PlaceHolder 3"/>
           <p:cNvSpPr>
             <a:spLocks noGrp="1"/>
           </p:cNvSpPr>
@@ -1735,8 +1714,8 @@
         </p:nvSpPr>
         <p:spPr>
           <a:xfrm>
-            <a:off x="4674240" y="1600200"/>
-            <a:ext cx="4015800" cy="2158560"/>
+            <a:off x="4674240" y="1604520"/>
+            <a:ext cx="4015800" cy="1896840"/>
           </a:xfrm>
           <a:prstGeom prst="rect">
             <a:avLst/>
@@ -1745,23 +1724,23 @@
         <p:txBody>
           <a:bodyPr lIns="0" rIns="0" tIns="0" bIns="0"/>
           <a:p>
-            <a:endParaRPr b="0" lang="en-US" sz="3200" spc="-1" strike="noStrike">
-              <a:solidFill>
-                <a:srgbClr val="000000"/>
-              </a:solidFill>
-              <a:uFill>
-                <a:solidFill>
-                  <a:srgbClr val="ffffff"/>
-                </a:solidFill>
-              </a:uFill>
-              <a:latin typeface="Calibri"/>
-            </a:endParaRPr>
-          </a:p>
-        </p:txBody>
-      </p:sp>
-      <p:sp>
-        <p:nvSpPr>
-          <p:cNvPr id="21" name="PlaceHolder 4"/>
+            <a:endParaRPr b="0" lang="de-DE" sz="3200" spc="-1" strike="noStrike">
+              <a:solidFill>
+                <a:srgbClr val="000000"/>
+              </a:solidFill>
+              <a:uFill>
+                <a:solidFill>
+                  <a:srgbClr val="ffffff"/>
+                </a:solidFill>
+              </a:uFill>
+              <a:latin typeface="Arial"/>
+            </a:endParaRPr>
+          </a:p>
+        </p:txBody>
+      </p:sp>
+      <p:sp>
+        <p:nvSpPr>
+          <p:cNvPr id="16" name="PlaceHolder 4"/>
           <p:cNvSpPr>
             <a:spLocks noGrp="1"/>
           </p:cNvSpPr>
@@ -1771,8 +1750,8 @@
         </p:nvSpPr>
         <p:spPr>
           <a:xfrm>
-            <a:off x="4674240" y="3964320"/>
-            <a:ext cx="4015800" cy="2158560"/>
+            <a:off x="4674240" y="3682080"/>
+            <a:ext cx="4015800" cy="1896840"/>
           </a:xfrm>
           <a:prstGeom prst="rect">
             <a:avLst/>
@@ -1781,16 +1760,16 @@
         <p:txBody>
           <a:bodyPr lIns="0" rIns="0" tIns="0" bIns="0"/>
           <a:p>
-            <a:endParaRPr b="0" lang="en-US" sz="3200" spc="-1" strike="noStrike">
-              <a:solidFill>
-                <a:srgbClr val="000000"/>
-              </a:solidFill>
-              <a:uFill>
-                <a:solidFill>
-                  <a:srgbClr val="ffffff"/>
-                </a:solidFill>
-              </a:uFill>
-              <a:latin typeface="Calibri"/>
+            <a:endParaRPr b="0" lang="de-DE" sz="3200" spc="-1" strike="noStrike">
+              <a:solidFill>
+                <a:srgbClr val="000000"/>
+              </a:solidFill>
+              <a:uFill>
+                <a:solidFill>
+                  <a:srgbClr val="ffffff"/>
+                </a:solidFill>
+              </a:uFill>
+              <a:latin typeface="Arial"/>
             </a:endParaRPr>
           </a:p>
         </p:txBody>
@@ -1819,7 +1798,7 @@
       </p:grpSpPr>
       <p:sp>
         <p:nvSpPr>
-          <p:cNvPr id="22" name="PlaceHolder 1"/>
+          <p:cNvPr id="17" name="PlaceHolder 1"/>
           <p:cNvSpPr>
             <a:spLocks noGrp="1"/>
           </p:cNvSpPr>
@@ -1829,8 +1808,8 @@
         </p:nvSpPr>
         <p:spPr>
           <a:xfrm>
-            <a:off x="457200" y="274680"/>
-            <a:ext cx="8229240" cy="1142640"/>
+            <a:off x="457200" y="273600"/>
+            <a:ext cx="8229240" cy="1144800"/>
           </a:xfrm>
           <a:prstGeom prst="rect">
             <a:avLst/>
@@ -1839,23 +1818,24 @@
         <p:txBody>
           <a:bodyPr lIns="0" rIns="0" tIns="0" bIns="0" anchor="ctr"/>
           <a:p>
-            <a:endParaRPr b="0" lang="en-US" sz="1800" spc="-1" strike="noStrike">
-              <a:solidFill>
-                <a:srgbClr val="000000"/>
-              </a:solidFill>
-              <a:uFill>
-                <a:solidFill>
-                  <a:srgbClr val="ffffff"/>
-                </a:solidFill>
-              </a:uFill>
-              <a:latin typeface="Calibri"/>
-            </a:endParaRPr>
-          </a:p>
-        </p:txBody>
-      </p:sp>
-      <p:sp>
-        <p:nvSpPr>
-          <p:cNvPr id="23" name="PlaceHolder 2"/>
+            <a:pPr algn="ctr"/>
+            <a:endParaRPr b="0" lang="de-DE" sz="4400" spc="-1" strike="noStrike">
+              <a:solidFill>
+                <a:srgbClr val="000000"/>
+              </a:solidFill>
+              <a:uFill>
+                <a:solidFill>
+                  <a:srgbClr val="ffffff"/>
+                </a:solidFill>
+              </a:uFill>
+              <a:latin typeface="Arial"/>
+            </a:endParaRPr>
+          </a:p>
+        </p:txBody>
+      </p:sp>
+      <p:sp>
+        <p:nvSpPr>
+          <p:cNvPr id="18" name="PlaceHolder 2"/>
           <p:cNvSpPr>
             <a:spLocks noGrp="1"/>
           </p:cNvSpPr>
@@ -1865,8 +1845,8 @@
         </p:nvSpPr>
         <p:spPr>
           <a:xfrm>
-            <a:off x="457200" y="1600200"/>
-            <a:ext cx="4015800" cy="2158560"/>
+            <a:off x="457200" y="1604520"/>
+            <a:ext cx="4015800" cy="1896840"/>
           </a:xfrm>
           <a:prstGeom prst="rect">
             <a:avLst/>
@@ -1875,23 +1855,23 @@
         <p:txBody>
           <a:bodyPr lIns="0" rIns="0" tIns="0" bIns="0"/>
           <a:p>
-            <a:endParaRPr b="0" lang="en-US" sz="3200" spc="-1" strike="noStrike">
-              <a:solidFill>
-                <a:srgbClr val="000000"/>
-              </a:solidFill>
-              <a:uFill>
-                <a:solidFill>
-                  <a:srgbClr val="ffffff"/>
-                </a:solidFill>
-              </a:uFill>
-              <a:latin typeface="Calibri"/>
-            </a:endParaRPr>
-          </a:p>
-        </p:txBody>
-      </p:sp>
-      <p:sp>
-        <p:nvSpPr>
-          <p:cNvPr id="24" name="PlaceHolder 3"/>
+            <a:endParaRPr b="0" lang="de-DE" sz="3200" spc="-1" strike="noStrike">
+              <a:solidFill>
+                <a:srgbClr val="000000"/>
+              </a:solidFill>
+              <a:uFill>
+                <a:solidFill>
+                  <a:srgbClr val="ffffff"/>
+                </a:solidFill>
+              </a:uFill>
+              <a:latin typeface="Arial"/>
+            </a:endParaRPr>
+          </a:p>
+        </p:txBody>
+      </p:sp>
+      <p:sp>
+        <p:nvSpPr>
+          <p:cNvPr id="19" name="PlaceHolder 3"/>
           <p:cNvSpPr>
             <a:spLocks noGrp="1"/>
           </p:cNvSpPr>
@@ -1901,8 +1881,8 @@
         </p:nvSpPr>
         <p:spPr>
           <a:xfrm>
-            <a:off x="4674240" y="1600200"/>
-            <a:ext cx="4015800" cy="2158560"/>
+            <a:off x="4674240" y="1604520"/>
+            <a:ext cx="4015800" cy="1896840"/>
           </a:xfrm>
           <a:prstGeom prst="rect">
             <a:avLst/>
@@ -1911,23 +1891,23 @@
         <p:txBody>
           <a:bodyPr lIns="0" rIns="0" tIns="0" bIns="0"/>
           <a:p>
-            <a:endParaRPr b="0" lang="en-US" sz="3200" spc="-1" strike="noStrike">
-              <a:solidFill>
-                <a:srgbClr val="000000"/>
-              </a:solidFill>
-              <a:uFill>
-                <a:solidFill>
-                  <a:srgbClr val="ffffff"/>
-                </a:solidFill>
-              </a:uFill>
-              <a:latin typeface="Calibri"/>
-            </a:endParaRPr>
-          </a:p>
-        </p:txBody>
-      </p:sp>
-      <p:sp>
-        <p:nvSpPr>
-          <p:cNvPr id="25" name="PlaceHolder 4"/>
+            <a:endParaRPr b="0" lang="de-DE" sz="3200" spc="-1" strike="noStrike">
+              <a:solidFill>
+                <a:srgbClr val="000000"/>
+              </a:solidFill>
+              <a:uFill>
+                <a:solidFill>
+                  <a:srgbClr val="ffffff"/>
+                </a:solidFill>
+              </a:uFill>
+              <a:latin typeface="Arial"/>
+            </a:endParaRPr>
+          </a:p>
+        </p:txBody>
+      </p:sp>
+      <p:sp>
+        <p:nvSpPr>
+          <p:cNvPr id="20" name="PlaceHolder 4"/>
           <p:cNvSpPr>
             <a:spLocks noGrp="1"/>
           </p:cNvSpPr>
@@ -1937,8 +1917,8 @@
         </p:nvSpPr>
         <p:spPr>
           <a:xfrm>
-            <a:off x="457200" y="3964320"/>
-            <a:ext cx="8229240" cy="2158560"/>
+            <a:off x="457200" y="3682080"/>
+            <a:ext cx="8229240" cy="1896840"/>
           </a:xfrm>
           <a:prstGeom prst="rect">
             <a:avLst/>
@@ -1947,16 +1927,16 @@
         <p:txBody>
           <a:bodyPr lIns="0" rIns="0" tIns="0" bIns="0"/>
           <a:p>
-            <a:endParaRPr b="0" lang="en-US" sz="3200" spc="-1" strike="noStrike">
-              <a:solidFill>
-                <a:srgbClr val="000000"/>
-              </a:solidFill>
-              <a:uFill>
-                <a:solidFill>
-                  <a:srgbClr val="ffffff"/>
-                </a:solidFill>
-              </a:uFill>
-              <a:latin typeface="Calibri"/>
+            <a:endParaRPr b="0" lang="de-DE" sz="3200" spc="-1" strike="noStrike">
+              <a:solidFill>
+                <a:srgbClr val="000000"/>
+              </a:solidFill>
+              <a:uFill>
+                <a:solidFill>
+                  <a:srgbClr val="ffffff"/>
+                </a:solidFill>
+              </a:uFill>
+              <a:latin typeface="Arial"/>
             </a:endParaRPr>
           </a:p>
         </p:txBody>
@@ -1990,430 +1970,6 @@
           <a:chExt cx="0" cy="0"/>
         </a:xfrm>
       </p:grpSpPr>
-      <p:sp>
-        <p:nvSpPr>
-          <p:cNvPr id="0" name="PlaceHolder 1"/>
-          <p:cNvSpPr>
-            <a:spLocks noGrp="1"/>
-          </p:cNvSpPr>
-          <p:nvPr>
-            <p:ph type="title"/>
-          </p:nvPr>
-        </p:nvSpPr>
-        <p:spPr>
-          <a:xfrm>
-            <a:off x="457200" y="274680"/>
-            <a:ext cx="8229240" cy="1142640"/>
-          </a:xfrm>
-          <a:prstGeom prst="rect">
-            <a:avLst/>
-          </a:prstGeom>
-        </p:spPr>
-        <p:txBody>
-          <a:bodyPr anchor="ctr"/>
-          <a:p>
-            <a:pPr algn="ctr">
-              <a:lnSpc>
-                <a:spcPct val="100000"/>
-              </a:lnSpc>
-            </a:pPr>
-            <a:r>
-              <a:rPr b="0" lang="en-US" sz="4400" spc="-1" strike="noStrike">
-                <a:solidFill>
-                  <a:srgbClr val="000000"/>
-                </a:solidFill>
-                <a:uFill>
-                  <a:solidFill>
-                    <a:srgbClr val="ffffff"/>
-                  </a:solidFill>
-                </a:uFill>
-                <a:latin typeface="Calibri"/>
-              </a:rPr>
-              <a:t>Click to edit Master title style</a:t>
-            </a:r>
-            <a:endParaRPr b="0" lang="en-US" sz="4400" spc="-1" strike="noStrike">
-              <a:solidFill>
-                <a:srgbClr val="000000"/>
-              </a:solidFill>
-              <a:uFill>
-                <a:solidFill>
-                  <a:srgbClr val="ffffff"/>
-                </a:solidFill>
-              </a:uFill>
-              <a:latin typeface="Calibri"/>
-            </a:endParaRPr>
-          </a:p>
-        </p:txBody>
-      </p:sp>
-      <p:sp>
-        <p:nvSpPr>
-          <p:cNvPr id="1" name="PlaceHolder 2"/>
-          <p:cNvSpPr>
-            <a:spLocks noGrp="1"/>
-          </p:cNvSpPr>
-          <p:nvPr>
-            <p:ph type="body"/>
-          </p:nvPr>
-        </p:nvSpPr>
-        <p:spPr>
-          <a:xfrm>
-            <a:off x="457200" y="1600200"/>
-            <a:ext cx="8229240" cy="4525560"/>
-          </a:xfrm>
-          <a:prstGeom prst="rect">
-            <a:avLst/>
-          </a:prstGeom>
-        </p:spPr>
-        <p:txBody>
-          <a:bodyPr/>
-          <a:p>
-            <a:pPr marL="343080" indent="-342720">
-              <a:lnSpc>
-                <a:spcPct val="100000"/>
-              </a:lnSpc>
-              <a:spcBef>
-                <a:spcPts val="641"/>
-              </a:spcBef>
-              <a:buClr>
-                <a:srgbClr val="000000"/>
-              </a:buClr>
-              <a:buFont typeface="Arial"/>
-              <a:buChar char="•"/>
-            </a:pPr>
-            <a:r>
-              <a:rPr b="0" lang="en-US" sz="3200" spc="-1" strike="noStrike">
-                <a:solidFill>
-                  <a:srgbClr val="000000"/>
-                </a:solidFill>
-                <a:uFill>
-                  <a:solidFill>
-                    <a:srgbClr val="ffffff"/>
-                  </a:solidFill>
-                </a:uFill>
-                <a:latin typeface="Calibri"/>
-              </a:rPr>
-              <a:t>Click to edit Master text styles</a:t>
-            </a:r>
-            <a:endParaRPr b="0" lang="en-US" sz="3200" spc="-1" strike="noStrike">
-              <a:solidFill>
-                <a:srgbClr val="000000"/>
-              </a:solidFill>
-              <a:uFill>
-                <a:solidFill>
-                  <a:srgbClr val="ffffff"/>
-                </a:solidFill>
-              </a:uFill>
-              <a:latin typeface="Calibri"/>
-            </a:endParaRPr>
-          </a:p>
-          <a:p>
-            <a:pPr lvl="1" marL="743040" indent="-285480">
-              <a:lnSpc>
-                <a:spcPct val="100000"/>
-              </a:lnSpc>
-              <a:spcBef>
-                <a:spcPts val="561"/>
-              </a:spcBef>
-              <a:buClr>
-                <a:srgbClr val="000000"/>
-              </a:buClr>
-              <a:buFont typeface="Arial"/>
-              <a:buChar char="–"/>
-            </a:pPr>
-            <a:r>
-              <a:rPr b="0" lang="en-US" sz="2800" spc="-1" strike="noStrike">
-                <a:solidFill>
-                  <a:srgbClr val="000000"/>
-                </a:solidFill>
-                <a:uFill>
-                  <a:solidFill>
-                    <a:srgbClr val="ffffff"/>
-                  </a:solidFill>
-                </a:uFill>
-                <a:latin typeface="Calibri"/>
-              </a:rPr>
-              <a:t>Second level</a:t>
-            </a:r>
-            <a:endParaRPr b="0" lang="en-US" sz="3200" spc="-1" strike="noStrike">
-              <a:solidFill>
-                <a:srgbClr val="000000"/>
-              </a:solidFill>
-              <a:uFill>
-                <a:solidFill>
-                  <a:srgbClr val="ffffff"/>
-                </a:solidFill>
-              </a:uFill>
-              <a:latin typeface="Calibri"/>
-            </a:endParaRPr>
-          </a:p>
-          <a:p>
-            <a:pPr lvl="2" marL="1143000" indent="-228240">
-              <a:lnSpc>
-                <a:spcPct val="100000"/>
-              </a:lnSpc>
-              <a:spcBef>
-                <a:spcPts val="479"/>
-              </a:spcBef>
-              <a:buClr>
-                <a:srgbClr val="000000"/>
-              </a:buClr>
-              <a:buFont typeface="Arial"/>
-              <a:buChar char="•"/>
-            </a:pPr>
-            <a:r>
-              <a:rPr b="0" lang="en-US" sz="2400" spc="-1" strike="noStrike">
-                <a:solidFill>
-                  <a:srgbClr val="000000"/>
-                </a:solidFill>
-                <a:uFill>
-                  <a:solidFill>
-                    <a:srgbClr val="ffffff"/>
-                  </a:solidFill>
-                </a:uFill>
-                <a:latin typeface="Calibri"/>
-              </a:rPr>
-              <a:t>Third level</a:t>
-            </a:r>
-            <a:endParaRPr b="0" lang="en-US" sz="3200" spc="-1" strike="noStrike">
-              <a:solidFill>
-                <a:srgbClr val="000000"/>
-              </a:solidFill>
-              <a:uFill>
-                <a:solidFill>
-                  <a:srgbClr val="ffffff"/>
-                </a:solidFill>
-              </a:uFill>
-              <a:latin typeface="Calibri"/>
-            </a:endParaRPr>
-          </a:p>
-          <a:p>
-            <a:pPr lvl="3" marL="1600200" indent="-228240">
-              <a:lnSpc>
-                <a:spcPct val="100000"/>
-              </a:lnSpc>
-              <a:spcBef>
-                <a:spcPts val="400"/>
-              </a:spcBef>
-              <a:buClr>
-                <a:srgbClr val="000000"/>
-              </a:buClr>
-              <a:buFont typeface="Arial"/>
-              <a:buChar char="–"/>
-            </a:pPr>
-            <a:r>
-              <a:rPr b="0" lang="en-US" sz="2000" spc="-1" strike="noStrike">
-                <a:solidFill>
-                  <a:srgbClr val="000000"/>
-                </a:solidFill>
-                <a:uFill>
-                  <a:solidFill>
-                    <a:srgbClr val="ffffff"/>
-                  </a:solidFill>
-                </a:uFill>
-                <a:latin typeface="Calibri"/>
-              </a:rPr>
-              <a:t>Fourth level</a:t>
-            </a:r>
-            <a:endParaRPr b="0" lang="en-US" sz="3200" spc="-1" strike="noStrike">
-              <a:solidFill>
-                <a:srgbClr val="000000"/>
-              </a:solidFill>
-              <a:uFill>
-                <a:solidFill>
-                  <a:srgbClr val="ffffff"/>
-                </a:solidFill>
-              </a:uFill>
-              <a:latin typeface="Calibri"/>
-            </a:endParaRPr>
-          </a:p>
-          <a:p>
-            <a:pPr lvl="4" marL="2057400" indent="-228240">
-              <a:lnSpc>
-                <a:spcPct val="100000"/>
-              </a:lnSpc>
-              <a:spcBef>
-                <a:spcPts val="400"/>
-              </a:spcBef>
-              <a:buClr>
-                <a:srgbClr val="000000"/>
-              </a:buClr>
-              <a:buFont typeface="Arial"/>
-              <a:buChar char="»"/>
-            </a:pPr>
-            <a:r>
-              <a:rPr b="0" lang="en-US" sz="2000" spc="-1" strike="noStrike">
-                <a:solidFill>
-                  <a:srgbClr val="000000"/>
-                </a:solidFill>
-                <a:uFill>
-                  <a:solidFill>
-                    <a:srgbClr val="ffffff"/>
-                  </a:solidFill>
-                </a:uFill>
-                <a:latin typeface="Calibri"/>
-              </a:rPr>
-              <a:t>Fifth level</a:t>
-            </a:r>
-            <a:endParaRPr b="0" lang="en-US" sz="3200" spc="-1" strike="noStrike">
-              <a:solidFill>
-                <a:srgbClr val="000000"/>
-              </a:solidFill>
-              <a:uFill>
-                <a:solidFill>
-                  <a:srgbClr val="ffffff"/>
-                </a:solidFill>
-              </a:uFill>
-              <a:latin typeface="Calibri"/>
-            </a:endParaRPr>
-          </a:p>
-        </p:txBody>
-      </p:sp>
-      <p:sp>
-        <p:nvSpPr>
-          <p:cNvPr id="2" name="PlaceHolder 3"/>
-          <p:cNvSpPr>
-            <a:spLocks noGrp="1"/>
-          </p:cNvSpPr>
-          <p:nvPr>
-            <p:ph type="dt"/>
-          </p:nvPr>
-        </p:nvSpPr>
-        <p:spPr>
-          <a:xfrm>
-            <a:off x="457200" y="6356520"/>
-            <a:ext cx="2133360" cy="364680"/>
-          </a:xfrm>
-          <a:prstGeom prst="rect">
-            <a:avLst/>
-          </a:prstGeom>
-        </p:spPr>
-        <p:txBody>
-          <a:bodyPr anchor="ctr"/>
-          <a:p>
-            <a:pPr>
-              <a:lnSpc>
-                <a:spcPct val="100000"/>
-              </a:lnSpc>
-            </a:pPr>
-            <a:fld id="{0E352293-04B3-4720-86F0-48E6F1FE6E40}" type="datetime">
-              <a:rPr b="0" lang="de-DE" sz="1200" spc="-1" strike="noStrike">
-                <a:solidFill>
-                  <a:srgbClr val="8b8b8b"/>
-                </a:solidFill>
-                <a:uFill>
-                  <a:solidFill>
-                    <a:srgbClr val="ffffff"/>
-                  </a:solidFill>
-                </a:uFill>
-                <a:latin typeface="Calibri"/>
-              </a:rPr>
-              <a:t>23.07.17</a:t>
-            </a:fld>
-            <a:endParaRPr b="0" lang="de-DE" sz="1400" spc="-1" strike="noStrike">
-              <a:solidFill>
-                <a:srgbClr val="000000"/>
-              </a:solidFill>
-              <a:uFill>
-                <a:solidFill>
-                  <a:srgbClr val="ffffff"/>
-                </a:solidFill>
-              </a:uFill>
-              <a:latin typeface="Times New Roman"/>
-            </a:endParaRPr>
-          </a:p>
-        </p:txBody>
-      </p:sp>
-      <p:sp>
-        <p:nvSpPr>
-          <p:cNvPr id="3" name="PlaceHolder 4"/>
-          <p:cNvSpPr>
-            <a:spLocks noGrp="1"/>
-          </p:cNvSpPr>
-          <p:nvPr>
-            <p:ph type="ftr"/>
-          </p:nvPr>
-        </p:nvSpPr>
-        <p:spPr>
-          <a:xfrm>
-            <a:off x="3124080" y="6356520"/>
-            <a:ext cx="2895120" cy="364680"/>
-          </a:xfrm>
-          <a:prstGeom prst="rect">
-            <a:avLst/>
-          </a:prstGeom>
-        </p:spPr>
-        <p:txBody>
-          <a:bodyPr anchor="ctr"/>
-          <a:p>
-            <a:endParaRPr b="0" lang="de-DE" sz="2400" spc="-1" strike="noStrike">
-              <a:solidFill>
-                <a:srgbClr val="000000"/>
-              </a:solidFill>
-              <a:uFill>
-                <a:solidFill>
-                  <a:srgbClr val="ffffff"/>
-                </a:solidFill>
-              </a:uFill>
-              <a:latin typeface="Times New Roman"/>
-            </a:endParaRPr>
-          </a:p>
-        </p:txBody>
-      </p:sp>
-      <p:sp>
-        <p:nvSpPr>
-          <p:cNvPr id="4" name="PlaceHolder 5"/>
-          <p:cNvSpPr>
-            <a:spLocks noGrp="1"/>
-          </p:cNvSpPr>
-          <p:nvPr>
-            <p:ph type="sldNum"/>
-          </p:nvPr>
-        </p:nvSpPr>
-        <p:spPr>
-          <a:xfrm>
-            <a:off x="6553080" y="6356520"/>
-            <a:ext cx="2133360" cy="364680"/>
-          </a:xfrm>
-          <a:prstGeom prst="rect">
-            <a:avLst/>
-          </a:prstGeom>
-        </p:spPr>
-        <p:txBody>
-          <a:bodyPr anchor="ctr"/>
-          <a:p>
-            <a:pPr algn="r">
-              <a:lnSpc>
-                <a:spcPct val="100000"/>
-              </a:lnSpc>
-            </a:pPr>
-            <a:fld id="{8FF22C2C-B4E0-4A9E-9E52-1DACCAFB5A2C}" type="slidenum">
-              <a:rPr b="0" lang="de-DE" sz="1200" spc="-1" strike="noStrike">
-                <a:solidFill>
-                  <a:srgbClr val="8b8b8b"/>
-                </a:solidFill>
-                <a:uFill>
-                  <a:solidFill>
-                    <a:srgbClr val="ffffff"/>
-                  </a:solidFill>
-                </a:uFill>
-                <a:latin typeface="Calibri"/>
-              </a:rPr>
-              <a:t>&lt;Foliennummer&gt;</a:t>
-            </a:fld>
-            <a:endParaRPr b="0" lang="de-DE" sz="1400" spc="-1" strike="noStrike">
-              <a:solidFill>
-                <a:srgbClr val="000000"/>
-              </a:solidFill>
-              <a:uFill>
-                <a:solidFill>
-                  <a:srgbClr val="ffffff"/>
-                </a:solidFill>
-              </a:uFill>
-              <a:latin typeface="Times New Roman"/>
-            </a:endParaRPr>
-          </a:p>
-        </p:txBody>
-      </p:sp>
     </p:spTree>
   </p:cSld>
   <p:clrMap bg1="lt1" bg2="lt2" tx1="dk1" tx2="dk2" accent1="accent1" accent2="accent2" accent3="accent3" accent4="accent4" accent5="accent5" accent6="accent6" hlink="hlink" folHlink="folHlink"/>
@@ -2453,14 +2009,14 @@
       </p:grpSpPr>
       <p:sp>
         <p:nvSpPr>
-          <p:cNvPr id="46" name="TextShape 1"/>
-          <p:cNvSpPr txBox="1"/>
+          <p:cNvPr id="41" name="CustomShape 1"/>
+          <p:cNvSpPr/>
           <p:nvPr/>
         </p:nvSpPr>
         <p:spPr>
           <a:xfrm>
             <a:off x="457200" y="274680"/>
-            <a:ext cx="4759920" cy="1142640"/>
+            <a:ext cx="4759560" cy="1142280"/>
           </a:xfrm>
           <a:prstGeom prst="rect">
             <a:avLst/>
@@ -2470,16 +2026,17 @@
             <a:noFill/>
           </a:ln>
         </p:spPr>
-        <p:txBody>
-          <a:bodyPr anchor="ctr"/>
-          <a:p>
-            <a:pPr>
-              <a:lnSpc>
-                <a:spcPct val="100000"/>
-              </a:lnSpc>
-            </a:pPr>
+        <p:style>
+          <a:lnRef idx="0"/>
+          <a:fillRef idx="0"/>
+          <a:effectRef idx="0"/>
+          <a:fontRef idx="minor"/>
+        </p:style>
+        <p:txBody>
+          <a:bodyPr lIns="90000" rIns="90000" tIns="45000" bIns="45000" anchor="ctr"/>
+          <a:p>
             <a:r>
-              <a:rPr b="0" lang="en-US" sz="4400" spc="-1" strike="noStrike">
+              <a:rPr b="0" lang="de-DE" sz="4400" spc="-1" strike="noStrike">
                 <a:solidFill>
                   <a:srgbClr val="000000"/>
                 </a:solidFill>
@@ -2492,23 +2049,26 @@
               </a:rPr>
               <a:t>Stefan Mehner</a:t>
             </a:r>
+            <a:endParaRPr b="0" lang="de-DE" sz="1800" spc="-1" strike="noStrike">
+              <a:solidFill>
+                <a:srgbClr val="000000"/>
+              </a:solidFill>
+              <a:uFill>
+                <a:solidFill>
+                  <a:srgbClr val="ffffff"/>
+                </a:solidFill>
+              </a:uFill>
+              <a:latin typeface="Arial"/>
+            </a:endParaRPr>
+          </a:p>
+          <a:p>
+            <a:pPr>
+              <a:lnSpc>
+                <a:spcPct val="100000"/>
+              </a:lnSpc>
+            </a:pPr>
             <a:r>
-              <a:rPr b="0" lang="en-US" sz="4400" spc="-1" strike="noStrike">
-                <a:solidFill>
-                  <a:srgbClr val="000000"/>
-                </a:solidFill>
-                <a:uFill>
-                  <a:solidFill>
-                    <a:srgbClr val="ffffff"/>
-                  </a:solidFill>
-                </a:uFill>
-                <a:latin typeface="Calibri"/>
-              </a:rPr>
-              <a:t>
-</a:t>
-            </a:r>
-            <a:r>
-              <a:rPr b="0" i="1" lang="en-US" sz="2700" spc="-1" strike="noStrike">
+              <a:rPr b="0" i="1" lang="de-DE" sz="2700" spc="-1" strike="noStrike">
                 <a:solidFill>
                   <a:srgbClr val="000000"/>
                 </a:solidFill>
@@ -2521,30 +2081,30 @@
               </a:rPr>
               <a:t>BTU Cottbus-Senftenberg</a:t>
             </a:r>
-            <a:endParaRPr b="0" lang="en-US" sz="1800" spc="-1" strike="noStrike">
-              <a:solidFill>
-                <a:srgbClr val="000000"/>
-              </a:solidFill>
-              <a:uFill>
-                <a:solidFill>
-                  <a:srgbClr val="ffffff"/>
-                </a:solidFill>
-              </a:uFill>
-              <a:latin typeface="Calibri"/>
-            </a:endParaRPr>
-          </a:p>
-        </p:txBody>
-      </p:sp>
-      <p:sp>
-        <p:nvSpPr>
-          <p:cNvPr id="47" name="CustomShape 2"/>
+            <a:endParaRPr b="0" lang="de-DE" sz="1800" spc="-1" strike="noStrike">
+              <a:solidFill>
+                <a:srgbClr val="000000"/>
+              </a:solidFill>
+              <a:uFill>
+                <a:solidFill>
+                  <a:srgbClr val="ffffff"/>
+                </a:solidFill>
+              </a:uFill>
+              <a:latin typeface="Arial"/>
+            </a:endParaRPr>
+          </a:p>
+        </p:txBody>
+      </p:sp>
+      <p:sp>
+        <p:nvSpPr>
+          <p:cNvPr id="42" name="CustomShape 2"/>
           <p:cNvSpPr/>
           <p:nvPr/>
         </p:nvSpPr>
         <p:spPr>
           <a:xfrm>
             <a:off x="239760" y="1518840"/>
-            <a:ext cx="4150800" cy="2513160"/>
+            <a:ext cx="4150440" cy="2512800"/>
           </a:xfrm>
           <a:prstGeom prst="rect">
             <a:avLst/>
@@ -2564,7 +2124,7 @@
           <a:fontRef idx="minor"/>
         </p:style>
         <p:txBody>
-          <a:bodyPr/>
+          <a:bodyPr lIns="90000" rIns="90000" tIns="45000" bIns="45000"/>
           <a:p>
             <a:pPr>
               <a:lnSpc>
@@ -2585,23 +2145,24 @@
                   </a:solidFill>
                 </a:uFill>
                 <a:latin typeface="Calibri"/>
+                <a:ea typeface="DejaVu Sans"/>
               </a:rPr>
               <a:t>Research and Coding Interests</a:t>
             </a:r>
-            <a:endParaRPr b="0" lang="de-DE" sz="3200" spc="-1" strike="noStrike">
-              <a:solidFill>
-                <a:srgbClr val="000000"/>
-              </a:solidFill>
-              <a:uFill>
-                <a:solidFill>
-                  <a:srgbClr val="ffffff"/>
-                </a:solidFill>
-              </a:uFill>
-              <a:latin typeface="Arial"/>
-            </a:endParaRPr>
-          </a:p>
-          <a:p>
-            <a:pPr marL="343080" indent="-342720">
+            <a:endParaRPr b="0" lang="de-DE" sz="1800" spc="-1" strike="noStrike">
+              <a:solidFill>
+                <a:srgbClr val="000000"/>
+              </a:solidFill>
+              <a:uFill>
+                <a:solidFill>
+                  <a:srgbClr val="ffffff"/>
+                </a:solidFill>
+              </a:uFill>
+              <a:latin typeface="Arial"/>
+            </a:endParaRPr>
+          </a:p>
+          <a:p>
+            <a:pPr marL="343080" indent="-342360">
               <a:lnSpc>
                 <a:spcPct val="100000"/>
               </a:lnSpc>
@@ -2625,23 +2186,24 @@
                   </a:solidFill>
                 </a:uFill>
                 <a:latin typeface="Calibri"/>
+                <a:ea typeface="DejaVu Sans"/>
               </a:rPr>
               <a:t>Virtualization in IoT</a:t>
             </a:r>
-            <a:endParaRPr b="0" lang="de-DE" sz="3200" spc="-1" strike="noStrike">
-              <a:solidFill>
-                <a:srgbClr val="000000"/>
-              </a:solidFill>
-              <a:uFill>
-                <a:solidFill>
-                  <a:srgbClr val="ffffff"/>
-                </a:solidFill>
-              </a:uFill>
-              <a:latin typeface="Arial"/>
-            </a:endParaRPr>
-          </a:p>
-          <a:p>
-            <a:pPr lvl="1" marL="432000" indent="-216000">
+            <a:endParaRPr b="0" lang="de-DE" sz="1800" spc="-1" strike="noStrike">
+              <a:solidFill>
+                <a:srgbClr val="000000"/>
+              </a:solidFill>
+              <a:uFill>
+                <a:solidFill>
+                  <a:srgbClr val="ffffff"/>
+                </a:solidFill>
+              </a:uFill>
+              <a:latin typeface="Arial"/>
+            </a:endParaRPr>
+          </a:p>
+          <a:p>
+            <a:pPr lvl="1" marL="432000" indent="-215640">
               <a:lnSpc>
                 <a:spcPct val="100000"/>
               </a:lnSpc>
@@ -2666,23 +2228,24 @@
                   </a:solidFill>
                 </a:uFill>
                 <a:latin typeface="Calibri"/>
+                <a:ea typeface="DejaVu Sans"/>
               </a:rPr>
               <a:t>Software-defined Networking</a:t>
             </a:r>
-            <a:endParaRPr b="0" lang="de-DE" sz="3200" spc="-1" strike="noStrike">
-              <a:solidFill>
-                <a:srgbClr val="000000"/>
-              </a:solidFill>
-              <a:uFill>
-                <a:solidFill>
-                  <a:srgbClr val="ffffff"/>
-                </a:solidFill>
-              </a:uFill>
-              <a:latin typeface="Arial"/>
-            </a:endParaRPr>
-          </a:p>
-          <a:p>
-            <a:pPr lvl="1" marL="432000" indent="-216000">
+            <a:endParaRPr b="0" lang="de-DE" sz="1800" spc="-1" strike="noStrike">
+              <a:solidFill>
+                <a:srgbClr val="000000"/>
+              </a:solidFill>
+              <a:uFill>
+                <a:solidFill>
+                  <a:srgbClr val="ffffff"/>
+                </a:solidFill>
+              </a:uFill>
+              <a:latin typeface="Arial"/>
+            </a:endParaRPr>
+          </a:p>
+          <a:p>
+            <a:pPr lvl="1" marL="432000" indent="-215640">
               <a:lnSpc>
                 <a:spcPct val="100000"/>
               </a:lnSpc>
@@ -2707,23 +2270,24 @@
                   </a:solidFill>
                 </a:uFill>
                 <a:latin typeface="Calibri"/>
+                <a:ea typeface="DejaVu Sans"/>
               </a:rPr>
               <a:t>Container (LXC, Docker)</a:t>
             </a:r>
-            <a:endParaRPr b="0" lang="de-DE" sz="3200" spc="-1" strike="noStrike">
-              <a:solidFill>
-                <a:srgbClr val="000000"/>
-              </a:solidFill>
-              <a:uFill>
-                <a:solidFill>
-                  <a:srgbClr val="ffffff"/>
-                </a:solidFill>
-              </a:uFill>
-              <a:latin typeface="Arial"/>
-            </a:endParaRPr>
-          </a:p>
-          <a:p>
-            <a:pPr marL="343080" indent="-342720">
+            <a:endParaRPr b="0" lang="de-DE" sz="1800" spc="-1" strike="noStrike">
+              <a:solidFill>
+                <a:srgbClr val="000000"/>
+              </a:solidFill>
+              <a:uFill>
+                <a:solidFill>
+                  <a:srgbClr val="ffffff"/>
+                </a:solidFill>
+              </a:uFill>
+              <a:latin typeface="Arial"/>
+            </a:endParaRPr>
+          </a:p>
+          <a:p>
+            <a:pPr marL="343080" indent="-342360">
               <a:lnSpc>
                 <a:spcPct val="100000"/>
               </a:lnSpc>
@@ -2747,10 +2311,11 @@
                   </a:solidFill>
                 </a:uFill>
                 <a:latin typeface="Calibri"/>
+                <a:ea typeface="DejaVu Sans"/>
               </a:rPr>
               <a:t>Python, C++</a:t>
             </a:r>
-            <a:endParaRPr b="0" lang="de-DE" sz="3200" spc="-1" strike="noStrike">
+            <a:endParaRPr b="0" lang="de-DE" sz="1800" spc="-1" strike="noStrike">
               <a:solidFill>
                 <a:srgbClr val="000000"/>
               </a:solidFill>
@@ -2766,7 +2331,7 @@
       </p:sp>
       <p:pic>
         <p:nvPicPr>
-          <p:cNvPr id="48" name="Picture 9" descr=""/>
+          <p:cNvPr id="43" name="Picture 9" descr=""/>
           <p:cNvPicPr/>
           <p:nvPr/>
         </p:nvPicPr>
@@ -2777,7 +2342,7 @@
         <p:spPr>
           <a:xfrm>
             <a:off x="0" y="6155640"/>
-            <a:ext cx="3187440" cy="711000"/>
+            <a:ext cx="3187080" cy="710640"/>
           </a:xfrm>
           <a:prstGeom prst="rect">
             <a:avLst/>
@@ -2789,14 +2354,14 @@
       </p:pic>
       <p:sp>
         <p:nvSpPr>
-          <p:cNvPr id="49" name="CustomShape 3"/>
+          <p:cNvPr id="44" name="CustomShape 3"/>
           <p:cNvSpPr/>
           <p:nvPr/>
         </p:nvSpPr>
         <p:spPr>
           <a:xfrm>
             <a:off x="3412080" y="6226920"/>
-            <a:ext cx="5446440" cy="577080"/>
+            <a:ext cx="5446080" cy="576720"/>
           </a:xfrm>
           <a:prstGeom prst="rect">
             <a:avLst/>
@@ -2831,6 +2396,7 @@
                   </a:solidFill>
                 </a:uFill>
                 <a:latin typeface="Calibri"/>
+                <a:ea typeface="DejaVu Sans"/>
               </a:rPr>
               <a:t>GI-Dagstuhl Seminar 17303, July 23-28, 2017</a:t>
             </a:r>
@@ -2863,6 +2429,7 @@
                   </a:solidFill>
                 </a:uFill>
                 <a:latin typeface="Calibri"/>
+                <a:ea typeface="DejaVu Sans"/>
               </a:rPr>
               <a:t>IoT Hackathon: From Research to Practice</a:t>
             </a:r>
@@ -2882,14 +2449,14 @@
       </p:sp>
       <p:sp>
         <p:nvSpPr>
-          <p:cNvPr id="50" name="CustomShape 4"/>
+          <p:cNvPr id="45" name="CustomShape 4"/>
           <p:cNvSpPr/>
           <p:nvPr/>
         </p:nvSpPr>
         <p:spPr>
           <a:xfrm>
             <a:off x="239760" y="4248000"/>
-            <a:ext cx="8618760" cy="1798560"/>
+            <a:ext cx="8618400" cy="1798200"/>
           </a:xfrm>
           <a:prstGeom prst="rect">
             <a:avLst/>
@@ -2909,7 +2476,7 @@
           <a:fontRef idx="minor"/>
         </p:style>
         <p:txBody>
-          <a:bodyPr/>
+          <a:bodyPr lIns="90000" rIns="90000" tIns="45000" bIns="45000"/>
           <a:p>
             <a:pPr>
               <a:lnSpc>
@@ -2930,23 +2497,24 @@
                   </a:solidFill>
                 </a:uFill>
                 <a:latin typeface="Calibri"/>
+                <a:ea typeface="DejaVu Sans"/>
               </a:rPr>
               <a:t>Background</a:t>
             </a:r>
-            <a:endParaRPr b="0" lang="de-DE" sz="3200" spc="-1" strike="noStrike">
-              <a:solidFill>
-                <a:srgbClr val="000000"/>
-              </a:solidFill>
-              <a:uFill>
-                <a:solidFill>
-                  <a:srgbClr val="ffffff"/>
-                </a:solidFill>
-              </a:uFill>
-              <a:latin typeface="Arial"/>
-            </a:endParaRPr>
-          </a:p>
-          <a:p>
-            <a:pPr marL="343080" indent="-342720">
+            <a:endParaRPr b="0" lang="de-DE" sz="1800" spc="-1" strike="noStrike">
+              <a:solidFill>
+                <a:srgbClr val="000000"/>
+              </a:solidFill>
+              <a:uFill>
+                <a:solidFill>
+                  <a:srgbClr val="ffffff"/>
+                </a:solidFill>
+              </a:uFill>
+              <a:latin typeface="Arial"/>
+            </a:endParaRPr>
+          </a:p>
+          <a:p>
+            <a:pPr marL="343080" indent="-342360">
               <a:lnSpc>
                 <a:spcPct val="100000"/>
               </a:lnSpc>
@@ -2970,23 +2538,24 @@
                   </a:solidFill>
                 </a:uFill>
                 <a:latin typeface="Calibri"/>
+                <a:ea typeface="DejaVu Sans"/>
               </a:rPr>
               <a:t>Early stage researcher</a:t>
             </a:r>
-            <a:endParaRPr b="0" lang="de-DE" sz="3200" spc="-1" strike="noStrike">
-              <a:solidFill>
-                <a:srgbClr val="000000"/>
-              </a:solidFill>
-              <a:uFill>
-                <a:solidFill>
-                  <a:srgbClr val="ffffff"/>
-                </a:solidFill>
-              </a:uFill>
-              <a:latin typeface="Arial"/>
-            </a:endParaRPr>
-          </a:p>
-          <a:p>
-            <a:pPr marL="343080" indent="-342720">
+            <a:endParaRPr b="0" lang="de-DE" sz="1800" spc="-1" strike="noStrike">
+              <a:solidFill>
+                <a:srgbClr val="000000"/>
+              </a:solidFill>
+              <a:uFill>
+                <a:solidFill>
+                  <a:srgbClr val="ffffff"/>
+                </a:solidFill>
+              </a:uFill>
+              <a:latin typeface="Arial"/>
+            </a:endParaRPr>
+          </a:p>
+          <a:p>
+            <a:pPr marL="343080" indent="-342360">
               <a:lnSpc>
                 <a:spcPct val="100000"/>
               </a:lnSpc>
@@ -3010,23 +2579,24 @@
                   </a:solidFill>
                 </a:uFill>
                 <a:latin typeface="Calibri"/>
+                <a:ea typeface="DejaVu Sans"/>
               </a:rPr>
               <a:t>Working in SICIA (Security Indicators for Critical Infrastructure Analysis)</a:t>
             </a:r>
-            <a:endParaRPr b="0" lang="de-DE" sz="3200" spc="-1" strike="noStrike">
-              <a:solidFill>
-                <a:srgbClr val="000000"/>
-              </a:solidFill>
-              <a:uFill>
-                <a:solidFill>
-                  <a:srgbClr val="ffffff"/>
-                </a:solidFill>
-              </a:uFill>
-              <a:latin typeface="Arial"/>
-            </a:endParaRPr>
-          </a:p>
-          <a:p>
-            <a:pPr marL="343080" indent="-342720">
+            <a:endParaRPr b="0" lang="de-DE" sz="1800" spc="-1" strike="noStrike">
+              <a:solidFill>
+                <a:srgbClr val="000000"/>
+              </a:solidFill>
+              <a:uFill>
+                <a:solidFill>
+                  <a:srgbClr val="ffffff"/>
+                </a:solidFill>
+              </a:uFill>
+              <a:latin typeface="Arial"/>
+            </a:endParaRPr>
+          </a:p>
+          <a:p>
+            <a:pPr marL="343080" indent="-342360">
               <a:lnSpc>
                 <a:spcPct val="100000"/>
               </a:lnSpc>
@@ -3050,33 +2620,34 @@
                   </a:solidFill>
                 </a:uFill>
                 <a:latin typeface="Calibri"/>
+                <a:ea typeface="DejaVu Sans"/>
               </a:rPr>
               <a:t>Co-Founder of Cheeezbude in 03/2017 </a:t>
             </a:r>
-            <a:endParaRPr b="0" lang="de-DE" sz="3200" spc="-1" strike="noStrike">
-              <a:solidFill>
-                <a:srgbClr val="000000"/>
-              </a:solidFill>
-              <a:uFill>
-                <a:solidFill>
-                  <a:srgbClr val="ffffff"/>
-                </a:solidFill>
-              </a:uFill>
-              <a:latin typeface="Arial"/>
-            </a:endParaRPr>
-          </a:p>
-        </p:txBody>
-      </p:sp>
-      <p:sp>
-        <p:nvSpPr>
-          <p:cNvPr id="51" name="CustomShape 5"/>
+            <a:endParaRPr b="0" lang="de-DE" sz="1800" spc="-1" strike="noStrike">
+              <a:solidFill>
+                <a:srgbClr val="000000"/>
+              </a:solidFill>
+              <a:uFill>
+                <a:solidFill>
+                  <a:srgbClr val="ffffff"/>
+                </a:solidFill>
+              </a:uFill>
+              <a:latin typeface="Arial"/>
+            </a:endParaRPr>
+          </a:p>
+        </p:txBody>
+      </p:sp>
+      <p:sp>
+        <p:nvSpPr>
+          <p:cNvPr id="46" name="CustomShape 5"/>
           <p:cNvSpPr/>
           <p:nvPr/>
         </p:nvSpPr>
         <p:spPr>
           <a:xfrm>
             <a:off x="4698720" y="1944000"/>
-            <a:ext cx="4159800" cy="2088000"/>
+            <a:ext cx="4159440" cy="2087640"/>
           </a:xfrm>
           <a:prstGeom prst="rect">
             <a:avLst/>
@@ -3096,7 +2667,7 @@
           <a:fontRef idx="minor"/>
         </p:style>
         <p:txBody>
-          <a:bodyPr/>
+          <a:bodyPr lIns="90000" rIns="90000" tIns="45000" bIns="45000"/>
           <a:p>
             <a:pPr>
               <a:lnSpc>
@@ -3117,23 +2688,24 @@
                   </a:solidFill>
                 </a:uFill>
                 <a:latin typeface="Calibri"/>
+                <a:ea typeface="DejaVu Sans"/>
               </a:rPr>
               <a:t>Wish List of Hackathon Topics</a:t>
             </a:r>
-            <a:endParaRPr b="0" lang="de-DE" sz="3200" spc="-1" strike="noStrike">
-              <a:solidFill>
-                <a:srgbClr val="000000"/>
-              </a:solidFill>
-              <a:uFill>
-                <a:solidFill>
-                  <a:srgbClr val="ffffff"/>
-                </a:solidFill>
-              </a:uFill>
-              <a:latin typeface="Arial"/>
-            </a:endParaRPr>
-          </a:p>
-          <a:p>
-            <a:pPr marL="343080" indent="-342720">
+            <a:endParaRPr b="0" lang="de-DE" sz="1800" spc="-1" strike="noStrike">
+              <a:solidFill>
+                <a:srgbClr val="000000"/>
+              </a:solidFill>
+              <a:uFill>
+                <a:solidFill>
+                  <a:srgbClr val="ffffff"/>
+                </a:solidFill>
+              </a:uFill>
+              <a:latin typeface="Arial"/>
+            </a:endParaRPr>
+          </a:p>
+          <a:p>
+            <a:pPr marL="343080" indent="-342360">
               <a:lnSpc>
                 <a:spcPct val="100000"/>
               </a:lnSpc>
@@ -3157,23 +2729,24 @@
                   </a:solidFill>
                 </a:uFill>
                 <a:latin typeface="Calibri"/>
+                <a:ea typeface="DejaVu Sans"/>
               </a:rPr>
               <a:t>Practical experience with RIOT and protocol implementation</a:t>
             </a:r>
-            <a:endParaRPr b="0" lang="de-DE" sz="3200" spc="-1" strike="noStrike">
-              <a:solidFill>
-                <a:srgbClr val="000000"/>
-              </a:solidFill>
-              <a:uFill>
-                <a:solidFill>
-                  <a:srgbClr val="ffffff"/>
-                </a:solidFill>
-              </a:uFill>
-              <a:latin typeface="Arial"/>
-            </a:endParaRPr>
-          </a:p>
-          <a:p>
-            <a:pPr marL="343080" indent="-342720">
+            <a:endParaRPr b="0" lang="de-DE" sz="1800" spc="-1" strike="noStrike">
+              <a:solidFill>
+                <a:srgbClr val="000000"/>
+              </a:solidFill>
+              <a:uFill>
+                <a:solidFill>
+                  <a:srgbClr val="ffffff"/>
+                </a:solidFill>
+              </a:uFill>
+              <a:latin typeface="Arial"/>
+            </a:endParaRPr>
+          </a:p>
+          <a:p>
+            <a:pPr marL="343080" indent="-342360">
               <a:lnSpc>
                 <a:spcPct val="100000"/>
               </a:lnSpc>
@@ -3197,10 +2770,52 @@
                   </a:solidFill>
                 </a:uFill>
                 <a:latin typeface="Calibri"/>
+                <a:ea typeface="DejaVu Sans"/>
+              </a:rPr>
+              <a:t>HTTP/2 for RIOT?</a:t>
+            </a:r>
+            <a:endParaRPr b="0" lang="de-DE" sz="1800" spc="-1" strike="noStrike">
+              <a:solidFill>
+                <a:srgbClr val="000000"/>
+              </a:solidFill>
+              <a:uFill>
+                <a:solidFill>
+                  <a:srgbClr val="ffffff"/>
+                </a:solidFill>
+              </a:uFill>
+              <a:latin typeface="Arial"/>
+            </a:endParaRPr>
+          </a:p>
+          <a:p>
+            <a:pPr marL="343080" indent="-342360">
+              <a:lnSpc>
+                <a:spcPct val="100000"/>
+              </a:lnSpc>
+              <a:spcBef>
+                <a:spcPts val="400"/>
+              </a:spcBef>
+              <a:buClr>
+                <a:srgbClr val="000000"/>
+              </a:buClr>
+              <a:buFont typeface="Arial"/>
+              <a:buChar char="•"/>
+            </a:pPr>
+            <a:r>
+              <a:rPr b="0" lang="de-DE" sz="2000" spc="-1" strike="noStrike">
+                <a:solidFill>
+                  <a:srgbClr val="000000"/>
+                </a:solidFill>
+                <a:uFill>
+                  <a:solidFill>
+                    <a:srgbClr val="ffffff"/>
+                  </a:solidFill>
+                </a:uFill>
+                <a:latin typeface="Calibri"/>
+                <a:ea typeface="DejaVu Sans"/>
               </a:rPr>
               <a:t>Open for new ideas</a:t>
             </a:r>
-            <a:endParaRPr b="0" lang="de-DE" sz="3200" spc="-1" strike="noStrike">
+            <a:endParaRPr b="0" lang="de-DE" sz="1800" spc="-1" strike="noStrike">
               <a:solidFill>
                 <a:srgbClr val="000000"/>
               </a:solidFill>
@@ -3216,7 +2831,7 @@
       </p:sp>
       <p:pic>
         <p:nvPicPr>
-          <p:cNvPr id="52" name="" descr=""/>
+          <p:cNvPr id="47" name="" descr=""/>
           <p:cNvPicPr/>
           <p:nvPr/>
         </p:nvPicPr>
@@ -3227,7 +2842,7 @@
         <p:spPr>
           <a:xfrm>
             <a:off x="6573240" y="144000"/>
-            <a:ext cx="2320200" cy="1656000"/>
+            <a:ext cx="2319840" cy="1655640"/>
           </a:xfrm>
           <a:prstGeom prst="rect">
             <a:avLst/>
@@ -3239,7 +2854,7 @@
       </p:pic>
       <p:pic>
         <p:nvPicPr>
-          <p:cNvPr id="53" name="" descr=""/>
+          <p:cNvPr id="48" name="" descr=""/>
           <p:cNvPicPr/>
           <p:nvPr/>
         </p:nvPicPr>
@@ -3251,7 +2866,7 @@
         <p:spPr>
           <a:xfrm>
             <a:off x="5765040" y="5347800"/>
-            <a:ext cx="1038960" cy="879120"/>
+            <a:ext cx="1038600" cy="878760"/>
           </a:xfrm>
           <a:prstGeom prst="rect">
             <a:avLst/>

</xml_diff>